<commit_message>
Ajuste nos slides de busca binária
</commit_message>
<xml_diff>
--- a/estrategias/busca-binaria.pptx
+++ b/estrategias/busca-binaria.pptx
@@ -816,7 +816,7 @@
   <p:cSld>
     <p:spTree>
       <p:nvGrpSpPr>
-        <p:cNvPr id="183" name="Shape 183"/>
+        <p:cNvPr id="197" name="Shape 197"/>
         <p:cNvGrpSpPr/>
         <p:nvPr/>
       </p:nvGrpSpPr>
@@ -830,7 +830,7 @@
       </p:grpSpPr>
       <p:sp>
         <p:nvSpPr>
-          <p:cNvPr id="184" name="Google Shape;184;g1df295702c6_0_102:notes"/>
+          <p:cNvPr id="198" name="Google Shape;198;g1df295702c6_0_102:notes"/>
           <p:cNvSpPr/>
           <p:nvPr>
             <p:ph idx="2" type="sldImg"/>
@@ -865,7 +865,7 @@
       </p:sp>
       <p:sp>
         <p:nvSpPr>
-          <p:cNvPr id="185" name="Google Shape;185;g1df295702c6_0_102:notes"/>
+          <p:cNvPr id="199" name="Google Shape;199;g1df295702c6_0_102:notes"/>
           <p:cNvSpPr txBox="1"/>
           <p:nvPr>
             <p:ph idx="1" type="body"/>
@@ -915,7 +915,7 @@
   <p:cSld>
     <p:spTree>
       <p:nvGrpSpPr>
-        <p:cNvPr id="190" name="Shape 190"/>
+        <p:cNvPr id="204" name="Shape 204"/>
         <p:cNvGrpSpPr/>
         <p:nvPr/>
       </p:nvGrpSpPr>
@@ -929,7 +929,7 @@
       </p:grpSpPr>
       <p:sp>
         <p:nvSpPr>
-          <p:cNvPr id="191" name="Google Shape;191;g1df295702c6_0_111:notes"/>
+          <p:cNvPr id="205" name="Google Shape;205;g1df295702c6_0_111:notes"/>
           <p:cNvSpPr/>
           <p:nvPr>
             <p:ph idx="2" type="sldImg"/>
@@ -964,7 +964,7 @@
       </p:sp>
       <p:sp>
         <p:nvSpPr>
-          <p:cNvPr id="192" name="Google Shape;192;g1df295702c6_0_111:notes"/>
+          <p:cNvPr id="206" name="Google Shape;206;g1df295702c6_0_111:notes"/>
           <p:cNvSpPr txBox="1"/>
           <p:nvPr>
             <p:ph idx="1" type="body"/>
@@ -1113,7 +1113,7 @@
   <p:cSld>
     <p:spTree>
       <p:nvGrpSpPr>
-        <p:cNvPr id="99" name="Shape 99"/>
+        <p:cNvPr id="113" name="Shape 113"/>
         <p:cNvGrpSpPr/>
         <p:nvPr/>
       </p:nvGrpSpPr>
@@ -1127,7 +1127,7 @@
       </p:grpSpPr>
       <p:sp>
         <p:nvSpPr>
-          <p:cNvPr id="100" name="Google Shape;100;g1df295702c6_0_0:notes"/>
+          <p:cNvPr id="114" name="Google Shape;114;g1df295702c6_0_0:notes"/>
           <p:cNvSpPr/>
           <p:nvPr>
             <p:ph idx="2" type="sldImg"/>
@@ -1162,7 +1162,7 @@
       </p:sp>
       <p:sp>
         <p:nvSpPr>
-          <p:cNvPr id="101" name="Google Shape;101;g1df295702c6_0_0:notes"/>
+          <p:cNvPr id="115" name="Google Shape;115;g1df295702c6_0_0:notes"/>
           <p:cNvSpPr txBox="1"/>
           <p:nvPr>
             <p:ph idx="1" type="body"/>
@@ -1212,7 +1212,7 @@
   <p:cSld>
     <p:spTree>
       <p:nvGrpSpPr>
-        <p:cNvPr id="107" name="Shape 107"/>
+        <p:cNvPr id="121" name="Shape 121"/>
         <p:cNvGrpSpPr/>
         <p:nvPr/>
       </p:nvGrpSpPr>
@@ -1226,7 +1226,7 @@
       </p:grpSpPr>
       <p:sp>
         <p:nvSpPr>
-          <p:cNvPr id="108" name="Google Shape;108;g1df295702c6_0_5:notes"/>
+          <p:cNvPr id="122" name="Google Shape;122;g1df295702c6_0_5:notes"/>
           <p:cNvSpPr/>
           <p:nvPr>
             <p:ph idx="2" type="sldImg"/>
@@ -1261,7 +1261,7 @@
       </p:sp>
       <p:sp>
         <p:nvSpPr>
-          <p:cNvPr id="109" name="Google Shape;109;g1df295702c6_0_5:notes"/>
+          <p:cNvPr id="123" name="Google Shape;123;g1df295702c6_0_5:notes"/>
           <p:cNvSpPr txBox="1"/>
           <p:nvPr>
             <p:ph idx="1" type="body"/>
@@ -1311,7 +1311,7 @@
   <p:cSld>
     <p:spTree>
       <p:nvGrpSpPr>
-        <p:cNvPr id="122" name="Shape 122"/>
+        <p:cNvPr id="136" name="Shape 136"/>
         <p:cNvGrpSpPr/>
         <p:nvPr/>
       </p:nvGrpSpPr>
@@ -1325,7 +1325,7 @@
       </p:grpSpPr>
       <p:sp>
         <p:nvSpPr>
-          <p:cNvPr id="123" name="Google Shape;123;g1df295702c6_0_21:notes"/>
+          <p:cNvPr id="137" name="Google Shape;137;g1df295702c6_0_21:notes"/>
           <p:cNvSpPr/>
           <p:nvPr>
             <p:ph idx="2" type="sldImg"/>
@@ -1360,7 +1360,7 @@
       </p:sp>
       <p:sp>
         <p:nvSpPr>
-          <p:cNvPr id="124" name="Google Shape;124;g1df295702c6_0_21:notes"/>
+          <p:cNvPr id="138" name="Google Shape;138;g1df295702c6_0_21:notes"/>
           <p:cNvSpPr txBox="1"/>
           <p:nvPr>
             <p:ph idx="1" type="body"/>
@@ -1410,7 +1410,7 @@
   <p:cSld>
     <p:spTree>
       <p:nvGrpSpPr>
-        <p:cNvPr id="139" name="Shape 139"/>
+        <p:cNvPr id="153" name="Shape 153"/>
         <p:cNvGrpSpPr/>
         <p:nvPr/>
       </p:nvGrpSpPr>
@@ -1424,7 +1424,7 @@
       </p:grpSpPr>
       <p:sp>
         <p:nvSpPr>
-          <p:cNvPr id="140" name="Google Shape;140;g1df295702c6_0_39:notes"/>
+          <p:cNvPr id="154" name="Google Shape;154;g1df295702c6_0_39:notes"/>
           <p:cNvSpPr/>
           <p:nvPr>
             <p:ph idx="2" type="sldImg"/>
@@ -1459,7 +1459,7 @@
       </p:sp>
       <p:sp>
         <p:nvSpPr>
-          <p:cNvPr id="141" name="Google Shape;141;g1df295702c6_0_39:notes"/>
+          <p:cNvPr id="155" name="Google Shape;155;g1df295702c6_0_39:notes"/>
           <p:cNvSpPr txBox="1"/>
           <p:nvPr>
             <p:ph idx="1" type="body"/>
@@ -1509,7 +1509,7 @@
   <p:cSld>
     <p:spTree>
       <p:nvGrpSpPr>
-        <p:cNvPr id="147" name="Shape 147"/>
+        <p:cNvPr id="161" name="Shape 161"/>
         <p:cNvGrpSpPr/>
         <p:nvPr/>
       </p:nvGrpSpPr>
@@ -1523,7 +1523,7 @@
       </p:grpSpPr>
       <p:sp>
         <p:nvSpPr>
-          <p:cNvPr id="148" name="Google Shape;148;g1df295702c6_0_56:notes"/>
+          <p:cNvPr id="162" name="Google Shape;162;g1df295702c6_0_56:notes"/>
           <p:cNvSpPr/>
           <p:nvPr>
             <p:ph idx="2" type="sldImg"/>
@@ -1558,7 +1558,7 @@
       </p:sp>
       <p:sp>
         <p:nvSpPr>
-          <p:cNvPr id="149" name="Google Shape;149;g1df295702c6_0_56:notes"/>
+          <p:cNvPr id="163" name="Google Shape;163;g1df295702c6_0_56:notes"/>
           <p:cNvSpPr txBox="1"/>
           <p:nvPr>
             <p:ph idx="1" type="body"/>
@@ -1608,7 +1608,7 @@
   <p:cSld>
     <p:spTree>
       <p:nvGrpSpPr>
-        <p:cNvPr id="165" name="Shape 165"/>
+        <p:cNvPr id="179" name="Shape 179"/>
         <p:cNvGrpSpPr/>
         <p:nvPr/>
       </p:nvGrpSpPr>
@@ -1622,7 +1622,7 @@
       </p:grpSpPr>
       <p:sp>
         <p:nvSpPr>
-          <p:cNvPr id="166" name="Google Shape;166;g1df295702c6_0_74:notes"/>
+          <p:cNvPr id="180" name="Google Shape;180;g1df295702c6_0_74:notes"/>
           <p:cNvSpPr/>
           <p:nvPr>
             <p:ph idx="2" type="sldImg"/>
@@ -1657,7 +1657,7 @@
       </p:sp>
       <p:sp>
         <p:nvSpPr>
-          <p:cNvPr id="167" name="Google Shape;167;g1df295702c6_0_74:notes"/>
+          <p:cNvPr id="181" name="Google Shape;181;g1df295702c6_0_74:notes"/>
           <p:cNvSpPr txBox="1"/>
           <p:nvPr>
             <p:ph idx="1" type="body"/>
@@ -1707,7 +1707,7 @@
   <p:cSld>
     <p:spTree>
       <p:nvGrpSpPr>
-        <p:cNvPr id="173" name="Shape 173"/>
+        <p:cNvPr id="187" name="Shape 187"/>
         <p:cNvGrpSpPr/>
         <p:nvPr/>
       </p:nvGrpSpPr>
@@ -1721,7 +1721,7 @@
       </p:grpSpPr>
       <p:sp>
         <p:nvSpPr>
-          <p:cNvPr id="174" name="Google Shape;174;g1df295702c6_0_91:notes"/>
+          <p:cNvPr id="188" name="Google Shape;188;g1df295702c6_0_91:notes"/>
           <p:cNvSpPr/>
           <p:nvPr>
             <p:ph idx="2" type="sldImg"/>
@@ -1756,7 +1756,7 @@
       </p:sp>
       <p:sp>
         <p:nvSpPr>
-          <p:cNvPr id="175" name="Google Shape;175;g1df295702c6_0_91:notes"/>
+          <p:cNvPr id="189" name="Google Shape;189;g1df295702c6_0_91:notes"/>
           <p:cNvSpPr txBox="1"/>
           <p:nvPr>
             <p:ph idx="1" type="body"/>
@@ -8139,7 +8139,7 @@
             </a:pPr>
             <a:r>
               <a:rPr lang="pt-BR"/>
-              <a:t>Estruturas de dados intermediária </a:t>
+              <a:t>Técnicas de programação</a:t>
             </a:r>
             <a:endParaRPr/>
           </a:p>
@@ -8307,7 +8307,7 @@
   <p:cSld>
     <p:spTree>
       <p:nvGrpSpPr>
-        <p:cNvPr id="186" name="Shape 186"/>
+        <p:cNvPr id="200" name="Shape 200"/>
         <p:cNvGrpSpPr/>
         <p:nvPr/>
       </p:nvGrpSpPr>
@@ -8321,7 +8321,7 @@
       </p:grpSpPr>
       <p:sp>
         <p:nvSpPr>
-          <p:cNvPr id="187" name="Google Shape;187;p22"/>
+          <p:cNvPr id="201" name="Google Shape;201;p22"/>
           <p:cNvSpPr txBox="1"/>
           <p:nvPr>
             <p:ph type="title"/>
@@ -8370,7 +8370,7 @@
       </p:sp>
       <p:pic>
         <p:nvPicPr>
-          <p:cNvPr id="188" name="Google Shape;188;p22"/>
+          <p:cNvPr id="202" name="Google Shape;202;p22"/>
           <p:cNvPicPr preferRelativeResize="0"/>
           <p:nvPr/>
         </p:nvPicPr>
@@ -8398,7 +8398,7 @@
       </p:pic>
       <p:sp>
         <p:nvSpPr>
-          <p:cNvPr id="189" name="Google Shape;189;p22"/>
+          <p:cNvPr id="203" name="Google Shape;203;p22"/>
           <p:cNvSpPr txBox="1"/>
           <p:nvPr>
             <p:ph idx="12" type="sldNum"/>
@@ -8449,7 +8449,7 @@
   <p:cSld>
     <p:spTree>
       <p:nvGrpSpPr>
-        <p:cNvPr id="193" name="Shape 193"/>
+        <p:cNvPr id="207" name="Shape 207"/>
         <p:cNvGrpSpPr/>
         <p:nvPr/>
       </p:nvGrpSpPr>
@@ -8463,7 +8463,7 @@
       </p:grpSpPr>
       <p:sp>
         <p:nvSpPr>
-          <p:cNvPr id="194" name="Google Shape;194;p23"/>
+          <p:cNvPr id="208" name="Google Shape;208;p23"/>
           <p:cNvSpPr txBox="1"/>
           <p:nvPr>
             <p:ph type="title"/>
@@ -8512,7 +8512,7 @@
       </p:sp>
       <p:sp>
         <p:nvSpPr>
-          <p:cNvPr id="195" name="Google Shape;195;p23"/>
+          <p:cNvPr id="209" name="Google Shape;209;p23"/>
           <p:cNvSpPr txBox="1"/>
           <p:nvPr>
             <p:ph type="title"/>
@@ -8552,7 +8552,7 @@
       </p:sp>
       <p:sp>
         <p:nvSpPr>
-          <p:cNvPr id="196" name="Google Shape;196;p23"/>
+          <p:cNvPr id="210" name="Google Shape;210;p23"/>
           <p:cNvSpPr txBox="1"/>
           <p:nvPr>
             <p:ph idx="1" type="body"/>
@@ -8639,11 +8639,31 @@
             </a:r>
             <a:endParaRPr/>
           </a:p>
+          <a:p>
+            <a:pPr indent="-311150" lvl="0" marL="457200" marR="0" rtl="0" algn="l">
+              <a:lnSpc>
+                <a:spcPct val="115000"/>
+              </a:lnSpc>
+              <a:spcBef>
+                <a:spcPts val="0"/>
+              </a:spcBef>
+              <a:spcAft>
+                <a:spcPts val="0"/>
+              </a:spcAft>
+              <a:buSzPts val="1300"/>
+              <a:buChar char="●"/>
+            </a:pPr>
+            <a:r>
+              <a:rPr lang="pt-BR"/>
+              <a:t>A resolução apresentada só foi possível ao perceber a monotonicidade da busca nas faixas, que nos permitiu usar a busca binária e diminuir a complexidade da busca.</a:t>
+            </a:r>
+            <a:endParaRPr/>
+          </a:p>
         </p:txBody>
       </p:sp>
       <p:sp>
         <p:nvSpPr>
-          <p:cNvPr id="197" name="Google Shape;197;p23"/>
+          <p:cNvPr id="211" name="Google Shape;211;p23"/>
           <p:cNvSpPr txBox="1"/>
           <p:nvPr>
             <p:ph idx="12" type="sldNum"/>
@@ -8756,8 +8776,8 @@
         </p:nvSpPr>
         <p:spPr>
           <a:xfrm>
-            <a:off x="729450" y="2078875"/>
-            <a:ext cx="7688700" cy="2261100"/>
+            <a:off x="729450" y="1966363"/>
+            <a:ext cx="7688700" cy="1315200"/>
           </a:xfrm>
           <a:prstGeom prst="rect">
             <a:avLst/>
@@ -8769,7 +8789,7 @@
           </a:bodyPr>
           <a:lstStyle/>
           <a:p>
-            <a:pPr indent="0" lvl="0" marL="0" rtl="0" algn="l">
+            <a:pPr indent="0" lvl="0" marL="0" rtl="0" algn="just">
               <a:spcBef>
                 <a:spcPts val="0"/>
               </a:spcBef>
@@ -8793,7 +8813,7 @@
             <a:endParaRPr/>
           </a:p>
           <a:p>
-            <a:pPr indent="457200" lvl="0" marL="457200" rtl="0" algn="l">
+            <a:pPr indent="457200" lvl="0" marL="457200" rtl="0" algn="just">
               <a:spcBef>
                 <a:spcPts val="1200"/>
               </a:spcBef>
@@ -8810,14 +8830,54 @@
           </a:p>
         </p:txBody>
       </p:sp>
+      <p:sp>
+        <p:nvSpPr>
+          <p:cNvPr id="96" name="Google Shape;96;p14"/>
+          <p:cNvSpPr txBox="1"/>
+          <p:nvPr>
+            <p:ph idx="12" type="sldNum"/>
+          </p:nvPr>
+        </p:nvSpPr>
+        <p:spPr>
+          <a:xfrm>
+            <a:off x="8536302" y="4749851"/>
+            <a:ext cx="548700" cy="393600"/>
+          </a:xfrm>
+          <a:prstGeom prst="rect">
+            <a:avLst/>
+          </a:prstGeom>
+        </p:spPr>
+        <p:txBody>
+          <a:bodyPr anchorCtr="0" anchor="ctr" bIns="91425" lIns="91425" spcFirstLastPara="1" rIns="91425" wrap="square" tIns="91425">
+            <a:normAutofit/>
+          </a:bodyPr>
+          <a:lstStyle/>
+          <a:p>
+            <a:pPr indent="0" lvl="0" marL="0" rtl="0" algn="r">
+              <a:spcBef>
+                <a:spcPts val="0"/>
+              </a:spcBef>
+              <a:spcAft>
+                <a:spcPts val="0"/>
+              </a:spcAft>
+              <a:buNone/>
+            </a:pPr>
+            <a:fld id="{00000000-1234-1234-1234-123412341234}" type="slidenum">
+              <a:rPr lang="pt-BR"/>
+              <a:t>‹#›</a:t>
+            </a:fld>
+            <a:endParaRPr/>
+          </a:p>
+        </p:txBody>
+      </p:sp>
       <p:graphicFrame>
         <p:nvGraphicFramePr>
-          <p:cNvPr id="96" name="Google Shape;96;p14"/>
+          <p:cNvPr id="97" name="Google Shape;97;p14"/>
           <p:cNvGraphicFramePr/>
           <p:nvPr/>
         </p:nvGraphicFramePr>
         <p:xfrm>
-          <a:off x="952400" y="3484525"/>
+          <a:off x="1879050" y="3558500"/>
           <a:ext cx="3000000" cy="3000000"/>
         </p:xfrm>
         <a:graphic>
@@ -8825,7 +8885,1056 @@
             <a:tbl>
               <a:tblPr>
                 <a:noFill/>
-                <a:tableStyleId>{EF6C54AC-8347-44DC-8B8D-82E599C378D7}</a:tableStyleId>
+                <a:tableStyleId>{DF492A7A-051D-4208-8BED-D5CB58FBCB7F}</a:tableStyleId>
+              </a:tblPr>
+              <a:tblGrid>
+                <a:gridCol w="388450"/>
+              </a:tblGrid>
+              <a:tr h="396200">
+                <a:tc>
+                  <a:txBody>
+                    <a:bodyPr/>
+                    <a:lstStyle/>
+                    <a:p>
+                      <a:pPr indent="0" lvl="0" marL="0" rtl="0" algn="l">
+                        <a:spcBef>
+                          <a:spcPts val="0"/>
+                        </a:spcBef>
+                        <a:spcAft>
+                          <a:spcPts val="0"/>
+                        </a:spcAft>
+                        <a:buNone/>
+                      </a:pPr>
+                      <a:r>
+                        <a:rPr lang="pt-BR"/>
+                        <a:t>0</a:t>
+                      </a:r>
+                      <a:endParaRPr/>
+                    </a:p>
+                  </a:txBody>
+                  <a:tcPr marT="91425" marB="91425" marR="91425" marL="91425"/>
+                </a:tc>
+              </a:tr>
+            </a:tbl>
+          </a:graphicData>
+        </a:graphic>
+      </p:graphicFrame>
+      <p:graphicFrame>
+        <p:nvGraphicFramePr>
+          <p:cNvPr id="98" name="Google Shape;98;p14"/>
+          <p:cNvGraphicFramePr/>
+          <p:nvPr/>
+        </p:nvGraphicFramePr>
+        <p:xfrm>
+          <a:off x="2508550" y="3281575"/>
+          <a:ext cx="3000000" cy="3000000"/>
+        </p:xfrm>
+        <a:graphic>
+          <a:graphicData uri="http://schemas.openxmlformats.org/drawingml/2006/table">
+            <a:tbl>
+              <a:tblPr>
+                <a:noFill/>
+                <a:tableStyleId>{DF492A7A-051D-4208-8BED-D5CB58FBCB7F}</a:tableStyleId>
+              </a:tblPr>
+              <a:tblGrid>
+                <a:gridCol w="388450"/>
+              </a:tblGrid>
+              <a:tr h="396200">
+                <a:tc>
+                  <a:txBody>
+                    <a:bodyPr/>
+                    <a:lstStyle/>
+                    <a:p>
+                      <a:pPr indent="0" lvl="0" marL="0" rtl="0" algn="l">
+                        <a:spcBef>
+                          <a:spcPts val="0"/>
+                        </a:spcBef>
+                        <a:spcAft>
+                          <a:spcPts val="0"/>
+                        </a:spcAft>
+                        <a:buNone/>
+                      </a:pPr>
+                      <a:r>
+                        <a:rPr lang="pt-BR"/>
+                        <a:t>5</a:t>
+                      </a:r>
+                      <a:endParaRPr/>
+                    </a:p>
+                  </a:txBody>
+                  <a:tcPr marT="91425" marB="91425" marR="91425" marL="91425"/>
+                </a:tc>
+              </a:tr>
+            </a:tbl>
+          </a:graphicData>
+        </a:graphic>
+      </p:graphicFrame>
+      <p:graphicFrame>
+        <p:nvGraphicFramePr>
+          <p:cNvPr id="99" name="Google Shape;99;p14"/>
+          <p:cNvGraphicFramePr/>
+          <p:nvPr/>
+        </p:nvGraphicFramePr>
+        <p:xfrm>
+          <a:off x="2347850" y="4019850"/>
+          <a:ext cx="3000000" cy="3000000"/>
+        </p:xfrm>
+        <a:graphic>
+          <a:graphicData uri="http://schemas.openxmlformats.org/drawingml/2006/table">
+            <a:tbl>
+              <a:tblPr>
+                <a:noFill/>
+                <a:tableStyleId>{DF492A7A-051D-4208-8BED-D5CB58FBCB7F}</a:tableStyleId>
+              </a:tblPr>
+              <a:tblGrid>
+                <a:gridCol w="388450"/>
+              </a:tblGrid>
+              <a:tr h="396200">
+                <a:tc>
+                  <a:txBody>
+                    <a:bodyPr/>
+                    <a:lstStyle/>
+                    <a:p>
+                      <a:pPr indent="0" lvl="0" marL="0" rtl="0" algn="l">
+                        <a:spcBef>
+                          <a:spcPts val="0"/>
+                        </a:spcBef>
+                        <a:spcAft>
+                          <a:spcPts val="0"/>
+                        </a:spcAft>
+                        <a:buNone/>
+                      </a:pPr>
+                      <a:r>
+                        <a:rPr lang="pt-BR"/>
+                        <a:t>15</a:t>
+                      </a:r>
+                      <a:endParaRPr/>
+                    </a:p>
+                  </a:txBody>
+                  <a:tcPr marT="91425" marB="91425" marR="91425" marL="91425"/>
+                </a:tc>
+              </a:tr>
+            </a:tbl>
+          </a:graphicData>
+        </a:graphic>
+      </p:graphicFrame>
+      <p:graphicFrame>
+        <p:nvGraphicFramePr>
+          <p:cNvPr id="100" name="Google Shape;100;p14"/>
+          <p:cNvGraphicFramePr/>
+          <p:nvPr/>
+        </p:nvGraphicFramePr>
+        <p:xfrm>
+          <a:off x="3081700" y="3859175"/>
+          <a:ext cx="3000000" cy="3000000"/>
+        </p:xfrm>
+        <a:graphic>
+          <a:graphicData uri="http://schemas.openxmlformats.org/drawingml/2006/table">
+            <a:tbl>
+              <a:tblPr>
+                <a:noFill/>
+                <a:tableStyleId>{DF492A7A-051D-4208-8BED-D5CB58FBCB7F}</a:tableStyleId>
+              </a:tblPr>
+              <a:tblGrid>
+                <a:gridCol w="388450"/>
+              </a:tblGrid>
+              <a:tr h="396200">
+                <a:tc>
+                  <a:txBody>
+                    <a:bodyPr/>
+                    <a:lstStyle/>
+                    <a:p>
+                      <a:pPr indent="0" lvl="0" marL="0" rtl="0" algn="l">
+                        <a:spcBef>
+                          <a:spcPts val="0"/>
+                        </a:spcBef>
+                        <a:spcAft>
+                          <a:spcPts val="0"/>
+                        </a:spcAft>
+                        <a:buNone/>
+                      </a:pPr>
+                      <a:r>
+                        <a:rPr lang="pt-BR"/>
+                        <a:t>2</a:t>
+                      </a:r>
+                      <a:endParaRPr/>
+                    </a:p>
+                  </a:txBody>
+                  <a:tcPr marT="91425" marB="91425" marR="91425" marL="91425"/>
+                </a:tc>
+              </a:tr>
+            </a:tbl>
+          </a:graphicData>
+        </a:graphic>
+      </p:graphicFrame>
+      <p:graphicFrame>
+        <p:nvGraphicFramePr>
+          <p:cNvPr id="101" name="Google Shape;101;p14"/>
+          <p:cNvGraphicFramePr/>
+          <p:nvPr/>
+        </p:nvGraphicFramePr>
+        <p:xfrm>
+          <a:off x="3629150" y="3325750"/>
+          <a:ext cx="3000000" cy="3000000"/>
+        </p:xfrm>
+        <a:graphic>
+          <a:graphicData uri="http://schemas.openxmlformats.org/drawingml/2006/table">
+            <a:tbl>
+              <a:tblPr>
+                <a:noFill/>
+                <a:tableStyleId>{DF492A7A-051D-4208-8BED-D5CB58FBCB7F}</a:tableStyleId>
+              </a:tblPr>
+              <a:tblGrid>
+                <a:gridCol w="388450"/>
+              </a:tblGrid>
+              <a:tr h="396200">
+                <a:tc>
+                  <a:txBody>
+                    <a:bodyPr/>
+                    <a:lstStyle/>
+                    <a:p>
+                      <a:pPr indent="0" lvl="0" marL="0" rtl="0" algn="l">
+                        <a:spcBef>
+                          <a:spcPts val="0"/>
+                        </a:spcBef>
+                        <a:spcAft>
+                          <a:spcPts val="0"/>
+                        </a:spcAft>
+                        <a:buNone/>
+                      </a:pPr>
+                      <a:r>
+                        <a:rPr lang="pt-BR"/>
+                        <a:t>3</a:t>
+                      </a:r>
+                      <a:endParaRPr/>
+                    </a:p>
+                  </a:txBody>
+                  <a:tcPr marT="91425" marB="91425" marR="91425" marL="91425"/>
+                </a:tc>
+              </a:tr>
+            </a:tbl>
+          </a:graphicData>
+        </a:graphic>
+      </p:graphicFrame>
+      <p:graphicFrame>
+        <p:nvGraphicFramePr>
+          <p:cNvPr id="102" name="Google Shape;102;p14"/>
+          <p:cNvGraphicFramePr/>
+          <p:nvPr/>
+        </p:nvGraphicFramePr>
+        <p:xfrm>
+          <a:off x="2842300" y="4416050"/>
+          <a:ext cx="3000000" cy="3000000"/>
+        </p:xfrm>
+        <a:graphic>
+          <a:graphicData uri="http://schemas.openxmlformats.org/drawingml/2006/table">
+            <a:tbl>
+              <a:tblPr>
+                <a:noFill/>
+                <a:tableStyleId>{DF492A7A-051D-4208-8BED-D5CB58FBCB7F}</a:tableStyleId>
+              </a:tblPr>
+              <a:tblGrid>
+                <a:gridCol w="388450"/>
+              </a:tblGrid>
+              <a:tr h="396200">
+                <a:tc>
+                  <a:txBody>
+                    <a:bodyPr/>
+                    <a:lstStyle/>
+                    <a:p>
+                      <a:pPr indent="0" lvl="0" marL="0" rtl="0" algn="l">
+                        <a:spcBef>
+                          <a:spcPts val="0"/>
+                        </a:spcBef>
+                        <a:spcAft>
+                          <a:spcPts val="0"/>
+                        </a:spcAft>
+                        <a:buNone/>
+                      </a:pPr>
+                      <a:r>
+                        <a:rPr lang="pt-BR"/>
+                        <a:t>7</a:t>
+                      </a:r>
+                      <a:endParaRPr/>
+                    </a:p>
+                  </a:txBody>
+                  <a:tcPr marT="91425" marB="91425" marR="91425" marL="91425"/>
+                </a:tc>
+              </a:tr>
+            </a:tbl>
+          </a:graphicData>
+        </a:graphic>
+      </p:graphicFrame>
+      <p:graphicFrame>
+        <p:nvGraphicFramePr>
+          <p:cNvPr id="103" name="Google Shape;103;p14"/>
+          <p:cNvGraphicFramePr/>
+          <p:nvPr/>
+        </p:nvGraphicFramePr>
+        <p:xfrm>
+          <a:off x="3717800" y="4167275"/>
+          <a:ext cx="3000000" cy="3000000"/>
+        </p:xfrm>
+        <a:graphic>
+          <a:graphicData uri="http://schemas.openxmlformats.org/drawingml/2006/table">
+            <a:tbl>
+              <a:tblPr>
+                <a:noFill/>
+                <a:tableStyleId>{DF492A7A-051D-4208-8BED-D5CB58FBCB7F}</a:tableStyleId>
+              </a:tblPr>
+              <a:tblGrid>
+                <a:gridCol w="388450"/>
+              </a:tblGrid>
+              <a:tr h="396200">
+                <a:tc>
+                  <a:txBody>
+                    <a:bodyPr/>
+                    <a:lstStyle/>
+                    <a:p>
+                      <a:pPr indent="0" lvl="0" marL="0" rtl="0" algn="l">
+                        <a:spcBef>
+                          <a:spcPts val="0"/>
+                        </a:spcBef>
+                        <a:spcAft>
+                          <a:spcPts val="0"/>
+                        </a:spcAft>
+                        <a:buNone/>
+                      </a:pPr>
+                      <a:r>
+                        <a:rPr lang="pt-BR"/>
+                        <a:t>6</a:t>
+                      </a:r>
+                      <a:endParaRPr/>
+                    </a:p>
+                  </a:txBody>
+                  <a:tcPr marT="91425" marB="91425" marR="91425" marL="91425"/>
+                </a:tc>
+              </a:tr>
+            </a:tbl>
+          </a:graphicData>
+        </a:graphic>
+      </p:graphicFrame>
+      <p:graphicFrame>
+        <p:nvGraphicFramePr>
+          <p:cNvPr id="104" name="Google Shape;104;p14"/>
+          <p:cNvGraphicFramePr/>
+          <p:nvPr/>
+        </p:nvGraphicFramePr>
+        <p:xfrm>
+          <a:off x="4324900" y="3462975"/>
+          <a:ext cx="3000000" cy="3000000"/>
+        </p:xfrm>
+        <a:graphic>
+          <a:graphicData uri="http://schemas.openxmlformats.org/drawingml/2006/table">
+            <a:tbl>
+              <a:tblPr>
+                <a:noFill/>
+                <a:tableStyleId>{DF492A7A-051D-4208-8BED-D5CB58FBCB7F}</a:tableStyleId>
+              </a:tblPr>
+              <a:tblGrid>
+                <a:gridCol w="388450"/>
+              </a:tblGrid>
+              <a:tr h="396200">
+                <a:tc>
+                  <a:txBody>
+                    <a:bodyPr/>
+                    <a:lstStyle/>
+                    <a:p>
+                      <a:pPr indent="0" lvl="0" marL="0" rtl="0" algn="l">
+                        <a:spcBef>
+                          <a:spcPts val="0"/>
+                        </a:spcBef>
+                        <a:spcAft>
+                          <a:spcPts val="0"/>
+                        </a:spcAft>
+                        <a:buNone/>
+                      </a:pPr>
+                      <a:r>
+                        <a:rPr lang="pt-BR"/>
+                        <a:t>8</a:t>
+                      </a:r>
+                      <a:endParaRPr/>
+                    </a:p>
+                  </a:txBody>
+                  <a:tcPr marT="91425" marB="91425" marR="91425" marL="91425"/>
+                </a:tc>
+              </a:tr>
+            </a:tbl>
+          </a:graphicData>
+        </a:graphic>
+      </p:graphicFrame>
+      <p:graphicFrame>
+        <p:nvGraphicFramePr>
+          <p:cNvPr id="105" name="Google Shape;105;p14"/>
+          <p:cNvGraphicFramePr/>
+          <p:nvPr/>
+        </p:nvGraphicFramePr>
+        <p:xfrm>
+          <a:off x="4276025" y="4293175"/>
+          <a:ext cx="3000000" cy="3000000"/>
+        </p:xfrm>
+        <a:graphic>
+          <a:graphicData uri="http://schemas.openxmlformats.org/drawingml/2006/table">
+            <a:tbl>
+              <a:tblPr>
+                <a:noFill/>
+                <a:tableStyleId>{DF492A7A-051D-4208-8BED-D5CB58FBCB7F}</a:tableStyleId>
+              </a:tblPr>
+              <a:tblGrid>
+                <a:gridCol w="388450"/>
+              </a:tblGrid>
+              <a:tr h="396200">
+                <a:tc>
+                  <a:txBody>
+                    <a:bodyPr/>
+                    <a:lstStyle/>
+                    <a:p>
+                      <a:pPr indent="0" lvl="0" marL="0" rtl="0" algn="l">
+                        <a:spcBef>
+                          <a:spcPts val="0"/>
+                        </a:spcBef>
+                        <a:spcAft>
+                          <a:spcPts val="0"/>
+                        </a:spcAft>
+                        <a:buNone/>
+                      </a:pPr>
+                      <a:r>
+                        <a:rPr lang="pt-BR"/>
+                        <a:t>14</a:t>
+                      </a:r>
+                      <a:endParaRPr/>
+                    </a:p>
+                  </a:txBody>
+                  <a:tcPr marT="91425" marB="91425" marR="91425" marL="91425"/>
+                </a:tc>
+              </a:tr>
+            </a:tbl>
+          </a:graphicData>
+        </a:graphic>
+      </p:graphicFrame>
+      <p:graphicFrame>
+        <p:nvGraphicFramePr>
+          <p:cNvPr id="106" name="Google Shape;106;p14"/>
+          <p:cNvGraphicFramePr/>
+          <p:nvPr/>
+        </p:nvGraphicFramePr>
+        <p:xfrm>
+          <a:off x="4808600" y="3325750"/>
+          <a:ext cx="3000000" cy="3000000"/>
+        </p:xfrm>
+        <a:graphic>
+          <a:graphicData uri="http://schemas.openxmlformats.org/drawingml/2006/table">
+            <a:tbl>
+              <a:tblPr>
+                <a:noFill/>
+                <a:tableStyleId>{DF492A7A-051D-4208-8BED-D5CB58FBCB7F}</a:tableStyleId>
+              </a:tblPr>
+              <a:tblGrid>
+                <a:gridCol w="388450"/>
+              </a:tblGrid>
+              <a:tr h="396200">
+                <a:tc>
+                  <a:txBody>
+                    <a:bodyPr/>
+                    <a:lstStyle/>
+                    <a:p>
+                      <a:pPr indent="0" lvl="0" marL="0" rtl="0" algn="l">
+                        <a:spcBef>
+                          <a:spcPts val="0"/>
+                        </a:spcBef>
+                        <a:spcAft>
+                          <a:spcPts val="0"/>
+                        </a:spcAft>
+                        <a:buNone/>
+                      </a:pPr>
+                      <a:r>
+                        <a:rPr lang="pt-BR"/>
+                        <a:t>10</a:t>
+                      </a:r>
+                      <a:endParaRPr/>
+                    </a:p>
+                  </a:txBody>
+                  <a:tcPr marT="91425" marB="91425" marR="91425" marL="91425"/>
+                </a:tc>
+              </a:tr>
+            </a:tbl>
+          </a:graphicData>
+        </a:graphic>
+      </p:graphicFrame>
+      <p:graphicFrame>
+        <p:nvGraphicFramePr>
+          <p:cNvPr id="107" name="Google Shape;107;p14"/>
+          <p:cNvGraphicFramePr/>
+          <p:nvPr/>
+        </p:nvGraphicFramePr>
+        <p:xfrm>
+          <a:off x="4895550" y="4019850"/>
+          <a:ext cx="3000000" cy="3000000"/>
+        </p:xfrm>
+        <a:graphic>
+          <a:graphicData uri="http://schemas.openxmlformats.org/drawingml/2006/table">
+            <a:tbl>
+              <a:tblPr>
+                <a:noFill/>
+                <a:tableStyleId>{DF492A7A-051D-4208-8BED-D5CB58FBCB7F}</a:tableStyleId>
+              </a:tblPr>
+              <a:tblGrid>
+                <a:gridCol w="388450"/>
+              </a:tblGrid>
+              <a:tr h="396200">
+                <a:tc>
+                  <a:txBody>
+                    <a:bodyPr/>
+                    <a:lstStyle/>
+                    <a:p>
+                      <a:pPr indent="0" lvl="0" marL="0" rtl="0" algn="l">
+                        <a:spcBef>
+                          <a:spcPts val="0"/>
+                        </a:spcBef>
+                        <a:spcAft>
+                          <a:spcPts val="0"/>
+                        </a:spcAft>
+                        <a:buNone/>
+                      </a:pPr>
+                      <a:r>
+                        <a:rPr lang="pt-BR"/>
+                        <a:t>11</a:t>
+                      </a:r>
+                      <a:endParaRPr/>
+                    </a:p>
+                  </a:txBody>
+                  <a:tcPr marT="91425" marB="91425" marR="91425" marL="91425"/>
+                </a:tc>
+              </a:tr>
+            </a:tbl>
+          </a:graphicData>
+        </a:graphic>
+      </p:graphicFrame>
+      <p:graphicFrame>
+        <p:nvGraphicFramePr>
+          <p:cNvPr id="108" name="Google Shape;108;p14"/>
+          <p:cNvGraphicFramePr/>
+          <p:nvPr/>
+        </p:nvGraphicFramePr>
+        <p:xfrm>
+          <a:off x="5612850" y="3512950"/>
+          <a:ext cx="3000000" cy="3000000"/>
+        </p:xfrm>
+        <a:graphic>
+          <a:graphicData uri="http://schemas.openxmlformats.org/drawingml/2006/table">
+            <a:tbl>
+              <a:tblPr>
+                <a:noFill/>
+                <a:tableStyleId>{DF492A7A-051D-4208-8BED-D5CB58FBCB7F}</a:tableStyleId>
+              </a:tblPr>
+              <a:tblGrid>
+                <a:gridCol w="388450"/>
+              </a:tblGrid>
+              <a:tr h="396200">
+                <a:tc>
+                  <a:txBody>
+                    <a:bodyPr/>
+                    <a:lstStyle/>
+                    <a:p>
+                      <a:pPr indent="0" lvl="0" marL="0" rtl="0" algn="l">
+                        <a:spcBef>
+                          <a:spcPts val="0"/>
+                        </a:spcBef>
+                        <a:spcAft>
+                          <a:spcPts val="0"/>
+                        </a:spcAft>
+                        <a:buNone/>
+                      </a:pPr>
+                      <a:r>
+                        <a:rPr lang="pt-BR"/>
+                        <a:t>1</a:t>
+                      </a:r>
+                      <a:endParaRPr/>
+                    </a:p>
+                  </a:txBody>
+                  <a:tcPr marT="91425" marB="91425" marR="91425" marL="91425"/>
+                </a:tc>
+              </a:tr>
+            </a:tbl>
+          </a:graphicData>
+        </a:graphic>
+      </p:graphicFrame>
+      <p:graphicFrame>
+        <p:nvGraphicFramePr>
+          <p:cNvPr id="109" name="Google Shape;109;p14"/>
+          <p:cNvGraphicFramePr/>
+          <p:nvPr/>
+        </p:nvGraphicFramePr>
+        <p:xfrm>
+          <a:off x="5765250" y="4019850"/>
+          <a:ext cx="3000000" cy="3000000"/>
+        </p:xfrm>
+        <a:graphic>
+          <a:graphicData uri="http://schemas.openxmlformats.org/drawingml/2006/table">
+            <a:tbl>
+              <a:tblPr>
+                <a:noFill/>
+                <a:tableStyleId>{DF492A7A-051D-4208-8BED-D5CB58FBCB7F}</a:tableStyleId>
+              </a:tblPr>
+              <a:tblGrid>
+                <a:gridCol w="388450"/>
+              </a:tblGrid>
+              <a:tr h="396200">
+                <a:tc>
+                  <a:txBody>
+                    <a:bodyPr/>
+                    <a:lstStyle/>
+                    <a:p>
+                      <a:pPr indent="0" lvl="0" marL="0" rtl="0" algn="l">
+                        <a:spcBef>
+                          <a:spcPts val="0"/>
+                        </a:spcBef>
+                        <a:spcAft>
+                          <a:spcPts val="0"/>
+                        </a:spcAft>
+                        <a:buNone/>
+                      </a:pPr>
+                      <a:r>
+                        <a:rPr lang="pt-BR"/>
+                        <a:t>4</a:t>
+                      </a:r>
+                      <a:endParaRPr/>
+                    </a:p>
+                  </a:txBody>
+                  <a:tcPr marT="91425" marB="91425" marR="91425" marL="91425"/>
+                </a:tc>
+              </a:tr>
+            </a:tbl>
+          </a:graphicData>
+        </a:graphic>
+      </p:graphicFrame>
+      <p:graphicFrame>
+        <p:nvGraphicFramePr>
+          <p:cNvPr id="110" name="Google Shape;110;p14"/>
+          <p:cNvGraphicFramePr/>
+          <p:nvPr/>
+        </p:nvGraphicFramePr>
+        <p:xfrm>
+          <a:off x="6491650" y="3462975"/>
+          <a:ext cx="3000000" cy="3000000"/>
+        </p:xfrm>
+        <a:graphic>
+          <a:graphicData uri="http://schemas.openxmlformats.org/drawingml/2006/table">
+            <a:tbl>
+              <a:tblPr>
+                <a:noFill/>
+                <a:tableStyleId>{DF492A7A-051D-4208-8BED-D5CB58FBCB7F}</a:tableStyleId>
+              </a:tblPr>
+              <a:tblGrid>
+                <a:gridCol w="388450"/>
+              </a:tblGrid>
+              <a:tr h="396200">
+                <a:tc>
+                  <a:txBody>
+                    <a:bodyPr/>
+                    <a:lstStyle/>
+                    <a:p>
+                      <a:pPr indent="0" lvl="0" marL="0" rtl="0" algn="l">
+                        <a:spcBef>
+                          <a:spcPts val="0"/>
+                        </a:spcBef>
+                        <a:spcAft>
+                          <a:spcPts val="0"/>
+                        </a:spcAft>
+                        <a:buNone/>
+                      </a:pPr>
+                      <a:r>
+                        <a:rPr lang="pt-BR"/>
+                        <a:t>9</a:t>
+                      </a:r>
+                      <a:endParaRPr/>
+                    </a:p>
+                  </a:txBody>
+                  <a:tcPr marT="91425" marB="91425" marR="91425" marL="91425"/>
+                </a:tc>
+              </a:tr>
+            </a:tbl>
+          </a:graphicData>
+        </a:graphic>
+      </p:graphicFrame>
+      <p:graphicFrame>
+        <p:nvGraphicFramePr>
+          <p:cNvPr id="111" name="Google Shape;111;p14"/>
+          <p:cNvGraphicFramePr/>
+          <p:nvPr/>
+        </p:nvGraphicFramePr>
+        <p:xfrm>
+          <a:off x="6241500" y="4167275"/>
+          <a:ext cx="3000000" cy="3000000"/>
+        </p:xfrm>
+        <a:graphic>
+          <a:graphicData uri="http://schemas.openxmlformats.org/drawingml/2006/table">
+            <a:tbl>
+              <a:tblPr>
+                <a:noFill/>
+                <a:tableStyleId>{DF492A7A-051D-4208-8BED-D5CB58FBCB7F}</a:tableStyleId>
+              </a:tblPr>
+              <a:tblGrid>
+                <a:gridCol w="388450"/>
+              </a:tblGrid>
+              <a:tr h="396200">
+                <a:tc>
+                  <a:txBody>
+                    <a:bodyPr/>
+                    <a:lstStyle/>
+                    <a:p>
+                      <a:pPr indent="0" lvl="0" marL="0" rtl="0" algn="l">
+                        <a:spcBef>
+                          <a:spcPts val="0"/>
+                        </a:spcBef>
+                        <a:spcAft>
+                          <a:spcPts val="0"/>
+                        </a:spcAft>
+                        <a:buNone/>
+                      </a:pPr>
+                      <a:r>
+                        <a:rPr lang="pt-BR"/>
+                        <a:t>12</a:t>
+                      </a:r>
+                      <a:endParaRPr/>
+                    </a:p>
+                  </a:txBody>
+                  <a:tcPr marT="91425" marB="91425" marR="91425" marL="91425"/>
+                </a:tc>
+              </a:tr>
+            </a:tbl>
+          </a:graphicData>
+        </a:graphic>
+      </p:graphicFrame>
+      <p:graphicFrame>
+        <p:nvGraphicFramePr>
+          <p:cNvPr id="112" name="Google Shape;112;p14"/>
+          <p:cNvGraphicFramePr/>
+          <p:nvPr/>
+        </p:nvGraphicFramePr>
+        <p:xfrm>
+          <a:off x="6880100" y="4019850"/>
+          <a:ext cx="3000000" cy="3000000"/>
+        </p:xfrm>
+        <a:graphic>
+          <a:graphicData uri="http://schemas.openxmlformats.org/drawingml/2006/table">
+            <a:tbl>
+              <a:tblPr>
+                <a:noFill/>
+                <a:tableStyleId>{DF492A7A-051D-4208-8BED-D5CB58FBCB7F}</a:tableStyleId>
+              </a:tblPr>
+              <a:tblGrid>
+                <a:gridCol w="388450"/>
+              </a:tblGrid>
+              <a:tr h="396200">
+                <a:tc>
+                  <a:txBody>
+                    <a:bodyPr/>
+                    <a:lstStyle/>
+                    <a:p>
+                      <a:pPr indent="0" lvl="0" marL="0" rtl="0" algn="l">
+                        <a:spcBef>
+                          <a:spcPts val="0"/>
+                        </a:spcBef>
+                        <a:spcAft>
+                          <a:spcPts val="0"/>
+                        </a:spcAft>
+                        <a:buNone/>
+                      </a:pPr>
+                      <a:r>
+                        <a:rPr lang="pt-BR"/>
+                        <a:t>13</a:t>
+                      </a:r>
+                      <a:endParaRPr/>
+                    </a:p>
+                  </a:txBody>
+                  <a:tcPr marT="91425" marB="91425" marR="91425" marL="91425"/>
+                </a:tc>
+              </a:tr>
+            </a:tbl>
+          </a:graphicData>
+        </a:graphic>
+      </p:graphicFrame>
+    </p:spTree>
+  </p:cSld>
+  <p:clrMapOvr>
+    <a:masterClrMapping/>
+  </p:clrMapOvr>
+</p:sld>
+</file>
+
+<file path=ppt/slides/slide3.xml><?xml version="1.0" encoding="utf-8"?>
+<p:sld xmlns:a="http://schemas.openxmlformats.org/drawingml/2006/main" xmlns:r="http://schemas.openxmlformats.org/officeDocument/2006/relationships" xmlns:mc="http://schemas.openxmlformats.org/markup-compatibility/2006" xmlns:mv="urn:schemas-microsoft-com:mac:vml" xmlns:p="http://schemas.openxmlformats.org/presentationml/2006/main" xmlns:c="http://schemas.openxmlformats.org/drawingml/2006/chart" xmlns:dgm="http://schemas.openxmlformats.org/drawingml/2006/diagram" xmlns:o="urn:schemas-microsoft-com:office:office" xmlns:v="urn:schemas-microsoft-com:vml" xmlns:pvml="urn:schemas-microsoft-com:office:powerpoint" xmlns:com="http://schemas.openxmlformats.org/drawingml/2006/compatibility" xmlns:p14="http://schemas.microsoft.com/office/powerpoint/2010/main" xmlns:p15="http://schemas.microsoft.com/office/powerpoint/2012/main" xmlns:ahyp="http://schemas.microsoft.com/office/drawing/2018/hyperlinkcolor">
+  <p:cSld>
+    <p:spTree>
+      <p:nvGrpSpPr>
+        <p:cNvPr id="116" name="Shape 116"/>
+        <p:cNvGrpSpPr/>
+        <p:nvPr/>
+      </p:nvGrpSpPr>
+      <p:grpSpPr>
+        <a:xfrm>
+          <a:off x="0" y="0"/>
+          <a:ext cx="0" cy="0"/>
+          <a:chOff x="0" y="0"/>
+          <a:chExt cx="0" cy="0"/>
+        </a:xfrm>
+      </p:grpSpPr>
+      <p:sp>
+        <p:nvSpPr>
+          <p:cNvPr id="117" name="Google Shape;117;p15"/>
+          <p:cNvSpPr txBox="1"/>
+          <p:nvPr>
+            <p:ph type="title"/>
+          </p:nvPr>
+        </p:nvSpPr>
+        <p:spPr>
+          <a:xfrm>
+            <a:off x="729450" y="1318650"/>
+            <a:ext cx="7688700" cy="535200"/>
+          </a:xfrm>
+          <a:prstGeom prst="rect">
+            <a:avLst/>
+          </a:prstGeom>
+        </p:spPr>
+        <p:txBody>
+          <a:bodyPr anchorCtr="0" anchor="t" bIns="91425" lIns="91425" spcFirstLastPara="1" rIns="91425" wrap="square" tIns="91425">
+            <a:normAutofit fontScale="90000"/>
+          </a:bodyPr>
+          <a:lstStyle/>
+          <a:p>
+            <a:pPr indent="0" lvl="0" marL="0" rtl="0" algn="l">
+              <a:spcBef>
+                <a:spcPts val="0"/>
+              </a:spcBef>
+              <a:spcAft>
+                <a:spcPts val="0"/>
+              </a:spcAft>
+              <a:buNone/>
+            </a:pPr>
+            <a:r>
+              <a:rPr lang="pt-BR"/>
+              <a:t>Estratégias e complexidades</a:t>
+            </a:r>
+            <a:endParaRPr/>
+          </a:p>
+        </p:txBody>
+      </p:sp>
+      <p:sp>
+        <p:nvSpPr>
+          <p:cNvPr id="118" name="Google Shape;118;p15"/>
+          <p:cNvSpPr txBox="1"/>
+          <p:nvPr>
+            <p:ph idx="1" type="body"/>
+          </p:nvPr>
+        </p:nvSpPr>
+        <p:spPr>
+          <a:xfrm>
+            <a:off x="729450" y="1946050"/>
+            <a:ext cx="7688700" cy="3001500"/>
+          </a:xfrm>
+          <a:prstGeom prst="rect">
+            <a:avLst/>
+          </a:prstGeom>
+        </p:spPr>
+        <p:txBody>
+          <a:bodyPr anchorCtr="0" anchor="t" bIns="91425" lIns="91425" spcFirstLastPara="1" rIns="91425" wrap="square" tIns="91425">
+            <a:normAutofit/>
+          </a:bodyPr>
+          <a:lstStyle/>
+          <a:p>
+            <a:pPr indent="0" lvl="0" marL="0" rtl="0" algn="l">
+              <a:spcBef>
+                <a:spcPts val="0"/>
+              </a:spcBef>
+              <a:spcAft>
+                <a:spcPts val="0"/>
+              </a:spcAft>
+              <a:buNone/>
+            </a:pPr>
+            <a:r>
+              <a:rPr lang="pt-BR"/>
+              <a:t>	Ordenar e começar a procurar do menor valor e ir até o maior:</a:t>
+            </a:r>
+            <a:endParaRPr/>
+          </a:p>
+          <a:p>
+            <a:pPr indent="-304800" lvl="0" marL="457200" rtl="0" algn="l">
+              <a:spcBef>
+                <a:spcPts val="1200"/>
+              </a:spcBef>
+              <a:spcAft>
+                <a:spcPts val="0"/>
+              </a:spcAft>
+              <a:buSzPts val="1200"/>
+              <a:buChar char="●"/>
+            </a:pPr>
+            <a:r>
+              <a:rPr lang="pt-BR" sz="1200"/>
+              <a:t>Tentar primeiro o primeiro e ir testando até chegar no último</a:t>
+            </a:r>
+            <a:endParaRPr sz="1200"/>
+          </a:p>
+          <a:p>
+            <a:pPr indent="-304800" lvl="0" marL="457200" rtl="0" algn="l">
+              <a:spcBef>
+                <a:spcPts val="0"/>
+              </a:spcBef>
+              <a:spcAft>
+                <a:spcPts val="0"/>
+              </a:spcAft>
+              <a:buSzPts val="1200"/>
+              <a:buChar char="●"/>
+            </a:pPr>
+            <a:r>
+              <a:rPr lang="pt-BR" sz="1200"/>
+              <a:t>No pior caso possível, onde o número procurado é o último fazemos 16 tentativas, ou seja os N elementos.</a:t>
+            </a:r>
+            <a:endParaRPr sz="1200"/>
+          </a:p>
+          <a:p>
+            <a:pPr indent="-304800" lvl="0" marL="457200" rtl="0" algn="l">
+              <a:spcBef>
+                <a:spcPts val="0"/>
+              </a:spcBef>
+              <a:spcAft>
+                <a:spcPts val="0"/>
+              </a:spcAft>
+              <a:buSzPts val="1200"/>
+              <a:buChar char="●"/>
+            </a:pPr>
+            <a:r>
+              <a:rPr lang="pt-BR" sz="1200"/>
+              <a:t>Na situação atual são 8 tentativas, a 9° era a verdadeira.</a:t>
+            </a:r>
+            <a:endParaRPr sz="1200"/>
+          </a:p>
+          <a:p>
+            <a:pPr indent="-304800" lvl="0" marL="457200" rtl="0" algn="l">
+              <a:spcBef>
+                <a:spcPts val="0"/>
+              </a:spcBef>
+              <a:spcAft>
+                <a:spcPts val="0"/>
+              </a:spcAft>
+              <a:buSzPts val="1200"/>
+              <a:buChar char="●"/>
+            </a:pPr>
+            <a:r>
+              <a:rPr lang="pt-BR" sz="1200"/>
+              <a:t>Mas se fossem </a:t>
+            </a:r>
+            <a:r>
+              <a:rPr lang="pt-BR" sz="1200"/>
+              <a:t>1000 números? Poderíamos acabar tendo que ver todos. Complexidade temporal linear (N).</a:t>
+            </a:r>
+            <a:endParaRPr sz="1200"/>
+          </a:p>
+          <a:p>
+            <a:pPr indent="0" lvl="0" marL="0" rtl="0" algn="l">
+              <a:spcBef>
+                <a:spcPts val="1200"/>
+              </a:spcBef>
+              <a:spcAft>
+                <a:spcPts val="0"/>
+              </a:spcAft>
+              <a:buNone/>
+            </a:pPr>
+            <a:r>
+              <a:rPr lang="pt-BR"/>
+              <a:t>	</a:t>
+            </a:r>
+            <a:r>
+              <a:rPr lang="pt-BR"/>
+              <a:t>Ordenar e começar a procurar do maior valor e ir até o menor:</a:t>
+            </a:r>
+            <a:endParaRPr/>
+          </a:p>
+          <a:p>
+            <a:pPr indent="-304800" lvl="0" marL="457200" rtl="0" algn="l">
+              <a:spcBef>
+                <a:spcPts val="1200"/>
+              </a:spcBef>
+              <a:spcAft>
+                <a:spcPts val="0"/>
+              </a:spcAft>
+              <a:buSzPts val="1200"/>
+              <a:buChar char="●"/>
+            </a:pPr>
+            <a:r>
+              <a:rPr lang="pt-BR" sz="1200"/>
+              <a:t>Tentar primeiro o último e ir testando até chegar no primeiro</a:t>
+            </a:r>
+            <a:endParaRPr sz="1200"/>
+          </a:p>
+          <a:p>
+            <a:pPr indent="-304800" lvl="0" marL="457200" rtl="0" algn="l">
+              <a:spcBef>
+                <a:spcPts val="0"/>
+              </a:spcBef>
+              <a:spcAft>
+                <a:spcPts val="0"/>
+              </a:spcAft>
+              <a:buSzPts val="1200"/>
+              <a:buChar char="●"/>
+            </a:pPr>
+            <a:r>
+              <a:rPr lang="pt-BR" sz="1200"/>
+              <a:t>No pior caso possível, onde o número procurado é o primeiro da ordem fazemos 16 tentativas, ou seja os N elementos. </a:t>
+            </a:r>
+            <a:endParaRPr sz="1200"/>
+          </a:p>
+          <a:p>
+            <a:pPr indent="-304800" lvl="0" marL="457200" rtl="0" algn="l">
+              <a:spcBef>
+                <a:spcPts val="0"/>
+              </a:spcBef>
+              <a:spcAft>
+                <a:spcPts val="0"/>
+              </a:spcAft>
+              <a:buSzPts val="1200"/>
+              <a:buChar char="●"/>
+            </a:pPr>
+            <a:r>
+              <a:rPr lang="pt-BR" sz="1200"/>
+              <a:t>Na situação atual fora 7 tentativas, a 8° era verdadeira</a:t>
+            </a:r>
+            <a:endParaRPr sz="1200"/>
+          </a:p>
+          <a:p>
+            <a:pPr indent="-304800" lvl="0" marL="457200" rtl="0" algn="l">
+              <a:spcBef>
+                <a:spcPts val="0"/>
+              </a:spcBef>
+              <a:spcAft>
+                <a:spcPts val="0"/>
+              </a:spcAft>
+              <a:buSzPts val="1200"/>
+              <a:buChar char="●"/>
+            </a:pPr>
+            <a:r>
+              <a:rPr lang="pt-BR" sz="1200"/>
+              <a:t>Mas se fossem 1000 números? Poderíamos acabar tendo que ver todos. Complexidade temporal linear (N).</a:t>
+            </a:r>
+            <a:endParaRPr sz="1200"/>
+          </a:p>
+        </p:txBody>
+      </p:sp>
+      <p:graphicFrame>
+        <p:nvGraphicFramePr>
+          <p:cNvPr id="119" name="Google Shape;119;p15"/>
+          <p:cNvGraphicFramePr/>
+          <p:nvPr/>
+        </p:nvGraphicFramePr>
+        <p:xfrm>
+          <a:off x="954200" y="697425"/>
+          <a:ext cx="3000000" cy="3000000"/>
+        </p:xfrm>
+        <a:graphic>
+          <a:graphicData uri="http://schemas.openxmlformats.org/drawingml/2006/table">
+            <a:tbl>
+              <a:tblPr>
+                <a:noFill/>
+                <a:tableStyleId>{DF492A7A-051D-4208-8BED-D5CB58FBCB7F}</a:tableStyleId>
               </a:tblPr>
               <a:tblGrid>
                 <a:gridCol w="452450"/>
@@ -9221,752 +10330,7 @@
       </p:graphicFrame>
       <p:sp>
         <p:nvSpPr>
-          <p:cNvPr id="97" name="Google Shape;97;p14"/>
-          <p:cNvSpPr txBox="1"/>
-          <p:nvPr>
-            <p:ph idx="12" type="sldNum"/>
-          </p:nvPr>
-        </p:nvSpPr>
-        <p:spPr>
-          <a:xfrm>
-            <a:off x="8536302" y="4749851"/>
-            <a:ext cx="548700" cy="393600"/>
-          </a:xfrm>
-          <a:prstGeom prst="rect">
-            <a:avLst/>
-          </a:prstGeom>
-        </p:spPr>
-        <p:txBody>
-          <a:bodyPr anchorCtr="0" anchor="ctr" bIns="91425" lIns="91425" spcFirstLastPara="1" rIns="91425" wrap="square" tIns="91425">
-            <a:normAutofit/>
-          </a:bodyPr>
-          <a:lstStyle/>
-          <a:p>
-            <a:pPr indent="0" lvl="0" marL="0" rtl="0" algn="r">
-              <a:spcBef>
-                <a:spcPts val="0"/>
-              </a:spcBef>
-              <a:spcAft>
-                <a:spcPts val="0"/>
-              </a:spcAft>
-              <a:buNone/>
-            </a:pPr>
-            <a:fld id="{00000000-1234-1234-1234-123412341234}" type="slidenum">
-              <a:rPr lang="pt-BR"/>
-              <a:t>‹#›</a:t>
-            </a:fld>
-            <a:endParaRPr/>
-          </a:p>
-        </p:txBody>
-      </p:sp>
-      <p:sp>
-        <p:nvSpPr>
-          <p:cNvPr id="98" name="Google Shape;98;p14"/>
-          <p:cNvSpPr txBox="1"/>
-          <p:nvPr/>
-        </p:nvSpPr>
-        <p:spPr>
-          <a:xfrm>
-            <a:off x="3652625" y="4241525"/>
-            <a:ext cx="1200300" cy="400200"/>
-          </a:xfrm>
-          <a:prstGeom prst="rect">
-            <a:avLst/>
-          </a:prstGeom>
-          <a:noFill/>
-          <a:ln>
-            <a:noFill/>
-          </a:ln>
-        </p:spPr>
-        <p:txBody>
-          <a:bodyPr anchorCtr="0" anchor="t" bIns="91425" lIns="91425" spcFirstLastPara="1" rIns="91425" wrap="square" tIns="91425">
-            <a:spAutoFit/>
-          </a:bodyPr>
-          <a:lstStyle/>
-          <a:p>
-            <a:pPr indent="0" lvl="0" marL="0" rtl="0" algn="l">
-              <a:spcBef>
-                <a:spcPts val="0"/>
-              </a:spcBef>
-              <a:spcAft>
-                <a:spcPts val="0"/>
-              </a:spcAft>
-              <a:buNone/>
-            </a:pPr>
-            <a:r>
-              <a:rPr lang="pt-BR">
-                <a:latin typeface="Lato"/>
-                <a:ea typeface="Lato"/>
-                <a:cs typeface="Lato"/>
-                <a:sym typeface="Lato"/>
-              </a:rPr>
-              <a:t>embaralhar</a:t>
-            </a:r>
-            <a:endParaRPr>
-              <a:latin typeface="Lato"/>
-              <a:ea typeface="Lato"/>
-              <a:cs typeface="Lato"/>
-              <a:sym typeface="Lato"/>
-            </a:endParaRPr>
-          </a:p>
-        </p:txBody>
-      </p:sp>
-    </p:spTree>
-  </p:cSld>
-  <p:clrMapOvr>
-    <a:masterClrMapping/>
-  </p:clrMapOvr>
-</p:sld>
-</file>
-
-<file path=ppt/slides/slide3.xml><?xml version="1.0" encoding="utf-8"?>
-<p:sld xmlns:a="http://schemas.openxmlformats.org/drawingml/2006/main" xmlns:r="http://schemas.openxmlformats.org/officeDocument/2006/relationships" xmlns:mc="http://schemas.openxmlformats.org/markup-compatibility/2006" xmlns:mv="urn:schemas-microsoft-com:mac:vml" xmlns:p="http://schemas.openxmlformats.org/presentationml/2006/main" xmlns:c="http://schemas.openxmlformats.org/drawingml/2006/chart" xmlns:dgm="http://schemas.openxmlformats.org/drawingml/2006/diagram" xmlns:o="urn:schemas-microsoft-com:office:office" xmlns:v="urn:schemas-microsoft-com:vml" xmlns:pvml="urn:schemas-microsoft-com:office:powerpoint" xmlns:com="http://schemas.openxmlformats.org/drawingml/2006/compatibility" xmlns:p14="http://schemas.microsoft.com/office/powerpoint/2010/main" xmlns:p15="http://schemas.microsoft.com/office/powerpoint/2012/main" xmlns:ahyp="http://schemas.microsoft.com/office/drawing/2018/hyperlinkcolor">
-  <p:cSld>
-    <p:spTree>
-      <p:nvGrpSpPr>
-        <p:cNvPr id="102" name="Shape 102"/>
-        <p:cNvGrpSpPr/>
-        <p:nvPr/>
-      </p:nvGrpSpPr>
-      <p:grpSpPr>
-        <a:xfrm>
-          <a:off x="0" y="0"/>
-          <a:ext cx="0" cy="0"/>
-          <a:chOff x="0" y="0"/>
-          <a:chExt cx="0" cy="0"/>
-        </a:xfrm>
-      </p:grpSpPr>
-      <p:sp>
-        <p:nvSpPr>
-          <p:cNvPr id="103" name="Google Shape;103;p15"/>
-          <p:cNvSpPr txBox="1"/>
-          <p:nvPr>
-            <p:ph type="title"/>
-          </p:nvPr>
-        </p:nvSpPr>
-        <p:spPr>
-          <a:xfrm>
-            <a:off x="729450" y="1318650"/>
-            <a:ext cx="7688700" cy="535200"/>
-          </a:xfrm>
-          <a:prstGeom prst="rect">
-            <a:avLst/>
-          </a:prstGeom>
-        </p:spPr>
-        <p:txBody>
-          <a:bodyPr anchorCtr="0" anchor="t" bIns="91425" lIns="91425" spcFirstLastPara="1" rIns="91425" wrap="square" tIns="91425">
-            <a:normAutofit fontScale="90000"/>
-          </a:bodyPr>
-          <a:lstStyle/>
-          <a:p>
-            <a:pPr indent="0" lvl="0" marL="0" rtl="0" algn="l">
-              <a:spcBef>
-                <a:spcPts val="0"/>
-              </a:spcBef>
-              <a:spcAft>
-                <a:spcPts val="0"/>
-              </a:spcAft>
-              <a:buNone/>
-            </a:pPr>
-            <a:r>
-              <a:rPr lang="pt-BR"/>
-              <a:t>Estratégias e complexidades</a:t>
-            </a:r>
-            <a:endParaRPr/>
-          </a:p>
-        </p:txBody>
-      </p:sp>
-      <p:sp>
-        <p:nvSpPr>
-          <p:cNvPr id="104" name="Google Shape;104;p15"/>
-          <p:cNvSpPr txBox="1"/>
-          <p:nvPr>
-            <p:ph idx="1" type="body"/>
-          </p:nvPr>
-        </p:nvSpPr>
-        <p:spPr>
-          <a:xfrm>
-            <a:off x="729450" y="2078875"/>
-            <a:ext cx="7688700" cy="2803800"/>
-          </a:xfrm>
-          <a:prstGeom prst="rect">
-            <a:avLst/>
-          </a:prstGeom>
-        </p:spPr>
-        <p:txBody>
-          <a:bodyPr anchorCtr="0" anchor="t" bIns="91425" lIns="91425" spcFirstLastPara="1" rIns="91425" wrap="square" tIns="91425">
-            <a:normAutofit/>
-          </a:bodyPr>
-          <a:lstStyle/>
-          <a:p>
-            <a:pPr indent="0" lvl="0" marL="0" rtl="0" algn="l">
-              <a:spcBef>
-                <a:spcPts val="0"/>
-              </a:spcBef>
-              <a:spcAft>
-                <a:spcPts val="0"/>
-              </a:spcAft>
-              <a:buNone/>
-            </a:pPr>
-            <a:r>
-              <a:rPr lang="pt-BR"/>
-              <a:t>	Começar do menor valor e ir até o maior:</a:t>
-            </a:r>
-            <a:endParaRPr/>
-          </a:p>
-          <a:p>
-            <a:pPr indent="-304800" lvl="0" marL="457200" rtl="0" algn="l">
-              <a:spcBef>
-                <a:spcPts val="1200"/>
-              </a:spcBef>
-              <a:spcAft>
-                <a:spcPts val="0"/>
-              </a:spcAft>
-              <a:buSzPts val="1200"/>
-              <a:buChar char="●"/>
-            </a:pPr>
-            <a:r>
-              <a:rPr lang="pt-BR" sz="1200"/>
-              <a:t>Tentar primeiro o primeiro e ir testando até chegar no último</a:t>
-            </a:r>
-            <a:endParaRPr sz="1200"/>
-          </a:p>
-          <a:p>
-            <a:pPr indent="-304800" lvl="0" marL="457200" rtl="0" algn="l">
-              <a:spcBef>
-                <a:spcPts val="0"/>
-              </a:spcBef>
-              <a:spcAft>
-                <a:spcPts val="0"/>
-              </a:spcAft>
-              <a:buSzPts val="1200"/>
-              <a:buChar char="●"/>
-            </a:pPr>
-            <a:r>
-              <a:rPr lang="pt-BR" sz="1200"/>
-              <a:t>Na pior hipótese onde o número procurado é o último fazemos 16 tentativas, ou seja os N elementos.</a:t>
-            </a:r>
-            <a:endParaRPr sz="1200"/>
-          </a:p>
-          <a:p>
-            <a:pPr indent="-304800" lvl="0" marL="457200" rtl="0" algn="l">
-              <a:spcBef>
-                <a:spcPts val="0"/>
-              </a:spcBef>
-              <a:spcAft>
-                <a:spcPts val="0"/>
-              </a:spcAft>
-              <a:buSzPts val="1200"/>
-              <a:buChar char="●"/>
-            </a:pPr>
-            <a:r>
-              <a:rPr lang="pt-BR" sz="1200"/>
-              <a:t>Na situação atual são 8 tentativas, a 9° era a verdadeira.</a:t>
-            </a:r>
-            <a:endParaRPr sz="1200"/>
-          </a:p>
-          <a:p>
-            <a:pPr indent="-304800" lvl="0" marL="457200" rtl="0" algn="l">
-              <a:spcBef>
-                <a:spcPts val="0"/>
-              </a:spcBef>
-              <a:spcAft>
-                <a:spcPts val="0"/>
-              </a:spcAft>
-              <a:buSzPts val="1200"/>
-              <a:buChar char="●"/>
-            </a:pPr>
-            <a:r>
-              <a:rPr lang="pt-BR" sz="1200"/>
-              <a:t>Se fossem 1000?</a:t>
-            </a:r>
-            <a:endParaRPr sz="1200"/>
-          </a:p>
-          <a:p>
-            <a:pPr indent="0" lvl="0" marL="0" rtl="0" algn="l">
-              <a:spcBef>
-                <a:spcPts val="1200"/>
-              </a:spcBef>
-              <a:spcAft>
-                <a:spcPts val="0"/>
-              </a:spcAft>
-              <a:buNone/>
-            </a:pPr>
-            <a:r>
-              <a:rPr lang="pt-BR"/>
-              <a:t>	</a:t>
-            </a:r>
-            <a:r>
-              <a:rPr lang="pt-BR"/>
-              <a:t>Começar do maior valor e ir até o menor:</a:t>
-            </a:r>
-            <a:endParaRPr/>
-          </a:p>
-          <a:p>
-            <a:pPr indent="-304800" lvl="0" marL="457200" rtl="0" algn="l">
-              <a:spcBef>
-                <a:spcPts val="1200"/>
-              </a:spcBef>
-              <a:spcAft>
-                <a:spcPts val="0"/>
-              </a:spcAft>
-              <a:buSzPts val="1200"/>
-              <a:buChar char="●"/>
-            </a:pPr>
-            <a:r>
-              <a:rPr lang="pt-BR" sz="1200"/>
-              <a:t>Tentar primeiro o último e ir testando até chegar no primeiro</a:t>
-            </a:r>
-            <a:endParaRPr sz="1200"/>
-          </a:p>
-          <a:p>
-            <a:pPr indent="-304800" lvl="0" marL="457200" rtl="0" algn="l">
-              <a:spcBef>
-                <a:spcPts val="0"/>
-              </a:spcBef>
-              <a:spcAft>
-                <a:spcPts val="0"/>
-              </a:spcAft>
-              <a:buSzPts val="1200"/>
-              <a:buChar char="●"/>
-            </a:pPr>
-            <a:r>
-              <a:rPr lang="pt-BR" sz="1200"/>
-              <a:t>Na pior hipótese onde o número procurado é o primeiro da ordem fazemos 16 tentativas, ou seja os N elementos. </a:t>
-            </a:r>
-            <a:endParaRPr sz="1200"/>
-          </a:p>
-          <a:p>
-            <a:pPr indent="-304800" lvl="0" marL="457200" rtl="0" algn="l">
-              <a:spcBef>
-                <a:spcPts val="0"/>
-              </a:spcBef>
-              <a:spcAft>
-                <a:spcPts val="0"/>
-              </a:spcAft>
-              <a:buSzPts val="1200"/>
-              <a:buChar char="●"/>
-            </a:pPr>
-            <a:r>
-              <a:rPr lang="pt-BR" sz="1200"/>
-              <a:t>Na situação atual fora 7 tentativas, a 8° era verdadeira</a:t>
-            </a:r>
-            <a:endParaRPr sz="1200"/>
-          </a:p>
-        </p:txBody>
-      </p:sp>
-      <p:graphicFrame>
-        <p:nvGraphicFramePr>
-          <p:cNvPr id="105" name="Google Shape;105;p15"/>
-          <p:cNvGraphicFramePr/>
-          <p:nvPr/>
-        </p:nvGraphicFramePr>
-        <p:xfrm>
-          <a:off x="954200" y="697425"/>
-          <a:ext cx="3000000" cy="3000000"/>
-        </p:xfrm>
-        <a:graphic>
-          <a:graphicData uri="http://schemas.openxmlformats.org/drawingml/2006/table">
-            <a:tbl>
-              <a:tblPr>
-                <a:noFill/>
-                <a:tableStyleId>{EF6C54AC-8347-44DC-8B8D-82E599C378D7}</a:tableStyleId>
-              </a:tblPr>
-              <a:tblGrid>
-                <a:gridCol w="452450"/>
-                <a:gridCol w="452450"/>
-                <a:gridCol w="452450"/>
-                <a:gridCol w="452450"/>
-                <a:gridCol w="452450"/>
-                <a:gridCol w="452450"/>
-                <a:gridCol w="452450"/>
-                <a:gridCol w="452450"/>
-                <a:gridCol w="452450"/>
-                <a:gridCol w="452450"/>
-                <a:gridCol w="452450"/>
-                <a:gridCol w="452450"/>
-                <a:gridCol w="452450"/>
-                <a:gridCol w="452450"/>
-                <a:gridCol w="452450"/>
-                <a:gridCol w="452450"/>
-              </a:tblGrid>
-              <a:tr h="381000">
-                <a:tc>
-                  <a:txBody>
-                    <a:bodyPr/>
-                    <a:lstStyle/>
-                    <a:p>
-                      <a:pPr indent="0" lvl="0" marL="0" rtl="0" algn="l">
-                        <a:spcBef>
-                          <a:spcPts val="0"/>
-                        </a:spcBef>
-                        <a:spcAft>
-                          <a:spcPts val="0"/>
-                        </a:spcAft>
-                        <a:buNone/>
-                      </a:pPr>
-                      <a:r>
-                        <a:rPr lang="pt-BR"/>
-                        <a:t>0</a:t>
-                      </a:r>
-                      <a:endParaRPr/>
-                    </a:p>
-                  </a:txBody>
-                  <a:tcPr marT="91425" marB="91425" marR="91425" marL="91425"/>
-                </a:tc>
-                <a:tc>
-                  <a:txBody>
-                    <a:bodyPr/>
-                    <a:lstStyle/>
-                    <a:p>
-                      <a:pPr indent="0" lvl="0" marL="0" rtl="0" algn="l">
-                        <a:spcBef>
-                          <a:spcPts val="0"/>
-                        </a:spcBef>
-                        <a:spcAft>
-                          <a:spcPts val="0"/>
-                        </a:spcAft>
-                        <a:buNone/>
-                      </a:pPr>
-                      <a:r>
-                        <a:rPr lang="pt-BR"/>
-                        <a:t>1</a:t>
-                      </a:r>
-                      <a:endParaRPr/>
-                    </a:p>
-                  </a:txBody>
-                  <a:tcPr marT="91425" marB="91425" marR="91425" marL="91425"/>
-                </a:tc>
-                <a:tc>
-                  <a:txBody>
-                    <a:bodyPr/>
-                    <a:lstStyle/>
-                    <a:p>
-                      <a:pPr indent="0" lvl="0" marL="0" rtl="0" algn="l">
-                        <a:spcBef>
-                          <a:spcPts val="0"/>
-                        </a:spcBef>
-                        <a:spcAft>
-                          <a:spcPts val="0"/>
-                        </a:spcAft>
-                        <a:buNone/>
-                      </a:pPr>
-                      <a:r>
-                        <a:rPr lang="pt-BR"/>
-                        <a:t>2</a:t>
-                      </a:r>
-                      <a:endParaRPr/>
-                    </a:p>
-                  </a:txBody>
-                  <a:tcPr marT="91425" marB="91425" marR="91425" marL="91425"/>
-                </a:tc>
-                <a:tc>
-                  <a:txBody>
-                    <a:bodyPr/>
-                    <a:lstStyle/>
-                    <a:p>
-                      <a:pPr indent="0" lvl="0" marL="0" rtl="0" algn="l">
-                        <a:spcBef>
-                          <a:spcPts val="0"/>
-                        </a:spcBef>
-                        <a:spcAft>
-                          <a:spcPts val="0"/>
-                        </a:spcAft>
-                        <a:buNone/>
-                      </a:pPr>
-                      <a:r>
-                        <a:rPr lang="pt-BR"/>
-                        <a:t>3</a:t>
-                      </a:r>
-                      <a:endParaRPr/>
-                    </a:p>
-                  </a:txBody>
-                  <a:tcPr marT="91425" marB="91425" marR="91425" marL="91425"/>
-                </a:tc>
-                <a:tc>
-                  <a:txBody>
-                    <a:bodyPr/>
-                    <a:lstStyle/>
-                    <a:p>
-                      <a:pPr indent="0" lvl="0" marL="0" rtl="0" algn="l">
-                        <a:spcBef>
-                          <a:spcPts val="0"/>
-                        </a:spcBef>
-                        <a:spcAft>
-                          <a:spcPts val="0"/>
-                        </a:spcAft>
-                        <a:buNone/>
-                      </a:pPr>
-                      <a:r>
-                        <a:rPr lang="pt-BR"/>
-                        <a:t>4</a:t>
-                      </a:r>
-                      <a:endParaRPr/>
-                    </a:p>
-                  </a:txBody>
-                  <a:tcPr marT="91425" marB="91425" marR="91425" marL="91425"/>
-                </a:tc>
-                <a:tc>
-                  <a:txBody>
-                    <a:bodyPr/>
-                    <a:lstStyle/>
-                    <a:p>
-                      <a:pPr indent="0" lvl="0" marL="0" rtl="0" algn="l">
-                        <a:spcBef>
-                          <a:spcPts val="0"/>
-                        </a:spcBef>
-                        <a:spcAft>
-                          <a:spcPts val="0"/>
-                        </a:spcAft>
-                        <a:buNone/>
-                      </a:pPr>
-                      <a:r>
-                        <a:rPr lang="pt-BR"/>
-                        <a:t>5</a:t>
-                      </a:r>
-                      <a:endParaRPr/>
-                    </a:p>
-                  </a:txBody>
-                  <a:tcPr marT="91425" marB="91425" marR="91425" marL="91425"/>
-                </a:tc>
-                <a:tc>
-                  <a:txBody>
-                    <a:bodyPr/>
-                    <a:lstStyle/>
-                    <a:p>
-                      <a:pPr indent="0" lvl="0" marL="0" rtl="0" algn="l">
-                        <a:spcBef>
-                          <a:spcPts val="0"/>
-                        </a:spcBef>
-                        <a:spcAft>
-                          <a:spcPts val="0"/>
-                        </a:spcAft>
-                        <a:buNone/>
-                      </a:pPr>
-                      <a:r>
-                        <a:rPr lang="pt-BR"/>
-                        <a:t>6</a:t>
-                      </a:r>
-                      <a:endParaRPr/>
-                    </a:p>
-                  </a:txBody>
-                  <a:tcPr marT="91425" marB="91425" marR="91425" marL="91425"/>
-                </a:tc>
-                <a:tc>
-                  <a:txBody>
-                    <a:bodyPr/>
-                    <a:lstStyle/>
-                    <a:p>
-                      <a:pPr indent="0" lvl="0" marL="0" rtl="0" algn="l">
-                        <a:spcBef>
-                          <a:spcPts val="0"/>
-                        </a:spcBef>
-                        <a:spcAft>
-                          <a:spcPts val="0"/>
-                        </a:spcAft>
-                        <a:buNone/>
-                      </a:pPr>
-                      <a:r>
-                        <a:rPr lang="pt-BR"/>
-                        <a:t>7</a:t>
-                      </a:r>
-                      <a:endParaRPr/>
-                    </a:p>
-                  </a:txBody>
-                  <a:tcPr marT="91425" marB="91425" marR="91425" marL="91425"/>
-                </a:tc>
-                <a:tc>
-                  <a:txBody>
-                    <a:bodyPr/>
-                    <a:lstStyle/>
-                    <a:p>
-                      <a:pPr indent="0" lvl="0" marL="0" rtl="0" algn="l">
-                        <a:spcBef>
-                          <a:spcPts val="0"/>
-                        </a:spcBef>
-                        <a:spcAft>
-                          <a:spcPts val="0"/>
-                        </a:spcAft>
-                        <a:buNone/>
-                      </a:pPr>
-                      <a:r>
-                        <a:rPr lang="pt-BR"/>
-                        <a:t>8</a:t>
-                      </a:r>
-                      <a:endParaRPr/>
-                    </a:p>
-                  </a:txBody>
-                  <a:tcPr marT="91425" marB="91425" marR="91425" marL="91425"/>
-                </a:tc>
-                <a:tc>
-                  <a:txBody>
-                    <a:bodyPr/>
-                    <a:lstStyle/>
-                    <a:p>
-                      <a:pPr indent="0" lvl="0" marL="0" rtl="0" algn="l">
-                        <a:spcBef>
-                          <a:spcPts val="0"/>
-                        </a:spcBef>
-                        <a:spcAft>
-                          <a:spcPts val="0"/>
-                        </a:spcAft>
-                        <a:buNone/>
-                      </a:pPr>
-                      <a:r>
-                        <a:rPr lang="pt-BR"/>
-                        <a:t>9</a:t>
-                      </a:r>
-                      <a:endParaRPr/>
-                    </a:p>
-                  </a:txBody>
-                  <a:tcPr marT="91425" marB="91425" marR="91425" marL="91425"/>
-                </a:tc>
-                <a:tc>
-                  <a:txBody>
-                    <a:bodyPr/>
-                    <a:lstStyle/>
-                    <a:p>
-                      <a:pPr indent="0" lvl="0" marL="0" rtl="0" algn="l">
-                        <a:spcBef>
-                          <a:spcPts val="0"/>
-                        </a:spcBef>
-                        <a:spcAft>
-                          <a:spcPts val="0"/>
-                        </a:spcAft>
-                        <a:buNone/>
-                      </a:pPr>
-                      <a:r>
-                        <a:rPr lang="pt-BR"/>
-                        <a:t>10</a:t>
-                      </a:r>
-                      <a:endParaRPr/>
-                    </a:p>
-                  </a:txBody>
-                  <a:tcPr marT="91425" marB="91425" marR="91425" marL="91425"/>
-                </a:tc>
-                <a:tc>
-                  <a:txBody>
-                    <a:bodyPr/>
-                    <a:lstStyle/>
-                    <a:p>
-                      <a:pPr indent="0" lvl="0" marL="0" rtl="0" algn="l">
-                        <a:spcBef>
-                          <a:spcPts val="0"/>
-                        </a:spcBef>
-                        <a:spcAft>
-                          <a:spcPts val="0"/>
-                        </a:spcAft>
-                        <a:buNone/>
-                      </a:pPr>
-                      <a:r>
-                        <a:rPr lang="pt-BR"/>
-                        <a:t>11</a:t>
-                      </a:r>
-                      <a:endParaRPr/>
-                    </a:p>
-                  </a:txBody>
-                  <a:tcPr marT="91425" marB="91425" marR="91425" marL="91425"/>
-                </a:tc>
-                <a:tc>
-                  <a:txBody>
-                    <a:bodyPr/>
-                    <a:lstStyle/>
-                    <a:p>
-                      <a:pPr indent="0" lvl="0" marL="0" rtl="0" algn="l">
-                        <a:spcBef>
-                          <a:spcPts val="0"/>
-                        </a:spcBef>
-                        <a:spcAft>
-                          <a:spcPts val="0"/>
-                        </a:spcAft>
-                        <a:buNone/>
-                      </a:pPr>
-                      <a:r>
-                        <a:rPr lang="pt-BR"/>
-                        <a:t>12</a:t>
-                      </a:r>
-                      <a:endParaRPr/>
-                    </a:p>
-                  </a:txBody>
-                  <a:tcPr marT="91425" marB="91425" marR="91425" marL="91425"/>
-                </a:tc>
-                <a:tc>
-                  <a:txBody>
-                    <a:bodyPr/>
-                    <a:lstStyle/>
-                    <a:p>
-                      <a:pPr indent="0" lvl="0" marL="0" rtl="0" algn="l">
-                        <a:spcBef>
-                          <a:spcPts val="0"/>
-                        </a:spcBef>
-                        <a:spcAft>
-                          <a:spcPts val="0"/>
-                        </a:spcAft>
-                        <a:buNone/>
-                      </a:pPr>
-                      <a:r>
-                        <a:rPr lang="pt-BR"/>
-                        <a:t>13</a:t>
-                      </a:r>
-                      <a:endParaRPr/>
-                    </a:p>
-                  </a:txBody>
-                  <a:tcPr marT="91425" marB="91425" marR="91425" marL="91425"/>
-                </a:tc>
-                <a:tc>
-                  <a:txBody>
-                    <a:bodyPr/>
-                    <a:lstStyle/>
-                    <a:p>
-                      <a:pPr indent="0" lvl="0" marL="0" rtl="0" algn="l">
-                        <a:spcBef>
-                          <a:spcPts val="0"/>
-                        </a:spcBef>
-                        <a:spcAft>
-                          <a:spcPts val="0"/>
-                        </a:spcAft>
-                        <a:buNone/>
-                      </a:pPr>
-                      <a:r>
-                        <a:rPr lang="pt-BR"/>
-                        <a:t>14</a:t>
-                      </a:r>
-                      <a:endParaRPr/>
-                    </a:p>
-                  </a:txBody>
-                  <a:tcPr marT="91425" marB="91425" marR="91425" marL="91425"/>
-                </a:tc>
-                <a:tc>
-                  <a:txBody>
-                    <a:bodyPr/>
-                    <a:lstStyle/>
-                    <a:p>
-                      <a:pPr indent="0" lvl="0" marL="0" rtl="0" algn="l">
-                        <a:spcBef>
-                          <a:spcPts val="0"/>
-                        </a:spcBef>
-                        <a:spcAft>
-                          <a:spcPts val="0"/>
-                        </a:spcAft>
-                        <a:buNone/>
-                      </a:pPr>
-                      <a:r>
-                        <a:rPr lang="pt-BR"/>
-                        <a:t>15</a:t>
-                      </a:r>
-                      <a:endParaRPr/>
-                    </a:p>
-                  </a:txBody>
-                  <a:tcPr marT="91425" marB="91425" marR="91425" marL="91425"/>
-                </a:tc>
-              </a:tr>
-            </a:tbl>
-          </a:graphicData>
-        </a:graphic>
-      </p:graphicFrame>
-      <p:sp>
-        <p:nvSpPr>
-          <p:cNvPr id="106" name="Google Shape;106;p15"/>
+          <p:cNvPr id="120" name="Google Shape;120;p15"/>
           <p:cNvSpPr txBox="1"/>
           <p:nvPr>
             <p:ph idx="12" type="sldNum"/>
@@ -10017,7 +10381,7 @@
   <p:cSld>
     <p:spTree>
       <p:nvGrpSpPr>
-        <p:cNvPr id="110" name="Shape 110"/>
+        <p:cNvPr id="124" name="Shape 124"/>
         <p:cNvGrpSpPr/>
         <p:nvPr/>
       </p:nvGrpSpPr>
@@ -10031,7 +10395,7 @@
       </p:grpSpPr>
       <p:sp>
         <p:nvSpPr>
-          <p:cNvPr id="111" name="Google Shape;111;p16"/>
+          <p:cNvPr id="125" name="Google Shape;125;p16"/>
           <p:cNvSpPr/>
           <p:nvPr/>
         </p:nvSpPr>
@@ -10082,7 +10446,7 @@
       </p:sp>
       <p:sp>
         <p:nvSpPr>
-          <p:cNvPr id="112" name="Google Shape;112;p16"/>
+          <p:cNvPr id="126" name="Google Shape;126;p16"/>
           <p:cNvSpPr/>
           <p:nvPr/>
         </p:nvSpPr>
@@ -10133,7 +10497,7 @@
       </p:sp>
       <p:sp>
         <p:nvSpPr>
-          <p:cNvPr id="113" name="Google Shape;113;p16"/>
+          <p:cNvPr id="127" name="Google Shape;127;p16"/>
           <p:cNvSpPr/>
           <p:nvPr/>
         </p:nvSpPr>
@@ -10184,7 +10548,7 @@
       </p:sp>
       <p:sp>
         <p:nvSpPr>
-          <p:cNvPr id="114" name="Google Shape;114;p16"/>
+          <p:cNvPr id="128" name="Google Shape;128;p16"/>
           <p:cNvSpPr txBox="1"/>
           <p:nvPr>
             <p:ph type="title"/>
@@ -10224,7 +10588,7 @@
       </p:sp>
       <p:sp>
         <p:nvSpPr>
-          <p:cNvPr id="115" name="Google Shape;115;p16"/>
+          <p:cNvPr id="129" name="Google Shape;129;p16"/>
           <p:cNvSpPr txBox="1"/>
           <p:nvPr>
             <p:ph idx="1" type="body"/>
@@ -10273,7 +10637,7 @@
             </a:pPr>
             <a:r>
               <a:rPr lang="pt-BR" sz="1200"/>
-              <a:t>Escolhemos o valor do meio, de maneira a eliminar pelo menos metade das possibilidades toda vez, se for maior ou menor restringimos o intervalo e escolhemos o valor central novamente, até chegarmos no valor procurado.</a:t>
+              <a:t>Ordenamos e escolhemos o valor do meio, de maneira a eliminar pelo menos metade das possibilidades toda vez, se for maior ou menor restringimos o intervalo e escolhemos o valor central novamente, até chegarmos no valor procurado.</a:t>
             </a:r>
             <a:endParaRPr sz="1200"/>
           </a:p>
@@ -10281,7 +10645,7 @@
       </p:sp>
       <p:graphicFrame>
         <p:nvGraphicFramePr>
-          <p:cNvPr id="116" name="Google Shape;116;p16"/>
+          <p:cNvPr id="130" name="Google Shape;130;p16"/>
           <p:cNvGraphicFramePr/>
           <p:nvPr/>
         </p:nvGraphicFramePr>
@@ -10294,7 +10658,7 @@
             <a:tbl>
               <a:tblPr>
                 <a:noFill/>
-                <a:tableStyleId>{EF6C54AC-8347-44DC-8B8D-82E599C378D7}</a:tableStyleId>
+                <a:tableStyleId>{DF492A7A-051D-4208-8BED-D5CB58FBCB7F}</a:tableStyleId>
               </a:tblPr>
               <a:tblGrid>
                 <a:gridCol w="452450"/>
@@ -10714,7 +11078,7 @@
       </p:graphicFrame>
       <p:graphicFrame>
         <p:nvGraphicFramePr>
-          <p:cNvPr id="117" name="Google Shape;117;p16"/>
+          <p:cNvPr id="131" name="Google Shape;131;p16"/>
           <p:cNvGraphicFramePr/>
           <p:nvPr/>
         </p:nvGraphicFramePr>
@@ -10727,7 +11091,7 @@
             <a:tbl>
               <a:tblPr>
                 <a:noFill/>
-                <a:tableStyleId>{EF6C54AC-8347-44DC-8B8D-82E599C378D7}</a:tableStyleId>
+                <a:tableStyleId>{DF492A7A-051D-4208-8BED-D5CB58FBCB7F}</a:tableStyleId>
               </a:tblPr>
               <a:tblGrid>
                 <a:gridCol w="452450"/>
@@ -10955,7 +11319,7 @@
       </p:graphicFrame>
       <p:graphicFrame>
         <p:nvGraphicFramePr>
-          <p:cNvPr id="118" name="Google Shape;118;p16"/>
+          <p:cNvPr id="132" name="Google Shape;132;p16"/>
           <p:cNvGraphicFramePr/>
           <p:nvPr/>
         </p:nvGraphicFramePr>
@@ -10968,7 +11332,7 @@
             <a:tbl>
               <a:tblPr>
                 <a:noFill/>
-                <a:tableStyleId>{EF6C54AC-8347-44DC-8B8D-82E599C378D7}</a:tableStyleId>
+                <a:tableStyleId>{DF492A7A-051D-4208-8BED-D5CB58FBCB7F}</a:tableStyleId>
               </a:tblPr>
               <a:tblGrid>
                 <a:gridCol w="452450"/>
@@ -11056,7 +11420,7 @@
       </p:graphicFrame>
       <p:graphicFrame>
         <p:nvGraphicFramePr>
-          <p:cNvPr id="119" name="Google Shape;119;p16"/>
+          <p:cNvPr id="133" name="Google Shape;133;p16"/>
           <p:cNvGraphicFramePr/>
           <p:nvPr/>
         </p:nvGraphicFramePr>
@@ -11069,7 +11433,7 @@
             <a:tbl>
               <a:tblPr>
                 <a:noFill/>
-                <a:tableStyleId>{EF6C54AC-8347-44DC-8B8D-82E599C378D7}</a:tableStyleId>
+                <a:tableStyleId>{DF492A7A-051D-4208-8BED-D5CB58FBCB7F}</a:tableStyleId>
               </a:tblPr>
               <a:tblGrid>
                 <a:gridCol w="452325"/>
@@ -11105,7 +11469,7 @@
       </p:graphicFrame>
       <p:sp>
         <p:nvSpPr>
-          <p:cNvPr id="120" name="Google Shape;120;p16"/>
+          <p:cNvPr id="134" name="Google Shape;134;p16"/>
           <p:cNvSpPr txBox="1"/>
           <p:nvPr>
             <p:ph idx="1" type="body"/>
@@ -11163,7 +11527,7 @@
       </p:sp>
       <p:sp>
         <p:nvSpPr>
-          <p:cNvPr id="121" name="Google Shape;121;p16"/>
+          <p:cNvPr id="135" name="Google Shape;135;p16"/>
           <p:cNvSpPr txBox="1"/>
           <p:nvPr>
             <p:ph idx="12" type="sldNum"/>
@@ -11214,7 +11578,7 @@
   <p:cSld>
     <p:spTree>
       <p:nvGrpSpPr>
-        <p:cNvPr id="125" name="Shape 125"/>
+        <p:cNvPr id="139" name="Shape 139"/>
         <p:cNvGrpSpPr/>
         <p:nvPr/>
       </p:nvGrpSpPr>
@@ -11228,7 +11592,7 @@
       </p:grpSpPr>
       <p:sp>
         <p:nvSpPr>
-          <p:cNvPr id="126" name="Google Shape;126;p17"/>
+          <p:cNvPr id="140" name="Google Shape;140;p17"/>
           <p:cNvSpPr/>
           <p:nvPr/>
         </p:nvSpPr>
@@ -11279,7 +11643,7 @@
       </p:sp>
       <p:sp>
         <p:nvSpPr>
-          <p:cNvPr id="127" name="Google Shape;127;p17"/>
+          <p:cNvPr id="141" name="Google Shape;141;p17"/>
           <p:cNvSpPr/>
           <p:nvPr/>
         </p:nvSpPr>
@@ -11330,7 +11694,7 @@
       </p:sp>
       <p:sp>
         <p:nvSpPr>
-          <p:cNvPr id="128" name="Google Shape;128;p17"/>
+          <p:cNvPr id="142" name="Google Shape;142;p17"/>
           <p:cNvSpPr/>
           <p:nvPr/>
         </p:nvSpPr>
@@ -11381,7 +11745,7 @@
       </p:sp>
       <p:sp>
         <p:nvSpPr>
-          <p:cNvPr id="129" name="Google Shape;129;p17"/>
+          <p:cNvPr id="143" name="Google Shape;143;p17"/>
           <p:cNvSpPr/>
           <p:nvPr/>
         </p:nvSpPr>
@@ -11432,7 +11796,7 @@
       </p:sp>
       <p:sp>
         <p:nvSpPr>
-          <p:cNvPr id="130" name="Google Shape;130;p17"/>
+          <p:cNvPr id="144" name="Google Shape;144;p17"/>
           <p:cNvSpPr txBox="1"/>
           <p:nvPr>
             <p:ph type="title"/>
@@ -11472,7 +11836,7 @@
       </p:sp>
       <p:sp>
         <p:nvSpPr>
-          <p:cNvPr id="131" name="Google Shape;131;p17"/>
+          <p:cNvPr id="145" name="Google Shape;145;p17"/>
           <p:cNvSpPr txBox="1"/>
           <p:nvPr>
             <p:ph idx="1" type="body"/>
@@ -11544,7 +11908,7 @@
       </p:sp>
       <p:graphicFrame>
         <p:nvGraphicFramePr>
-          <p:cNvPr id="132" name="Google Shape;132;p17"/>
+          <p:cNvPr id="146" name="Google Shape;146;p17"/>
           <p:cNvGraphicFramePr/>
           <p:nvPr/>
         </p:nvGraphicFramePr>
@@ -11557,7 +11921,7 @@
             <a:tbl>
               <a:tblPr>
                 <a:noFill/>
-                <a:tableStyleId>{EF6C54AC-8347-44DC-8B8D-82E599C378D7}</a:tableStyleId>
+                <a:tableStyleId>{DF492A7A-051D-4208-8BED-D5CB58FBCB7F}</a:tableStyleId>
               </a:tblPr>
               <a:tblGrid>
                 <a:gridCol w="452450"/>
@@ -11953,7 +12317,7 @@
       </p:graphicFrame>
       <p:graphicFrame>
         <p:nvGraphicFramePr>
-          <p:cNvPr id="133" name="Google Shape;133;p17"/>
+          <p:cNvPr id="147" name="Google Shape;147;p17"/>
           <p:cNvGraphicFramePr/>
           <p:nvPr/>
         </p:nvGraphicFramePr>
@@ -11966,7 +12330,7 @@
             <a:tbl>
               <a:tblPr>
                 <a:noFill/>
-                <a:tableStyleId>{EF6C54AC-8347-44DC-8B8D-82E599C378D7}</a:tableStyleId>
+                <a:tableStyleId>{DF492A7A-051D-4208-8BED-D5CB58FBCB7F}</a:tableStyleId>
               </a:tblPr>
               <a:tblGrid>
                 <a:gridCol w="452450"/>
@@ -12170,7 +12534,7 @@
       </p:graphicFrame>
       <p:graphicFrame>
         <p:nvGraphicFramePr>
-          <p:cNvPr id="134" name="Google Shape;134;p17"/>
+          <p:cNvPr id="148" name="Google Shape;148;p17"/>
           <p:cNvGraphicFramePr/>
           <p:nvPr/>
         </p:nvGraphicFramePr>
@@ -12183,7 +12547,7 @@
             <a:tbl>
               <a:tblPr>
                 <a:noFill/>
-                <a:tableStyleId>{EF6C54AC-8347-44DC-8B8D-82E599C378D7}</a:tableStyleId>
+                <a:tableStyleId>{DF492A7A-051D-4208-8BED-D5CB58FBCB7F}</a:tableStyleId>
               </a:tblPr>
               <a:tblGrid>
                 <a:gridCol w="452325"/>
@@ -12219,7 +12583,7 @@
       </p:graphicFrame>
       <p:graphicFrame>
         <p:nvGraphicFramePr>
-          <p:cNvPr id="135" name="Google Shape;135;p17"/>
+          <p:cNvPr id="149" name="Google Shape;149;p17"/>
           <p:cNvGraphicFramePr/>
           <p:nvPr/>
         </p:nvGraphicFramePr>
@@ -12232,7 +12596,7 @@
             <a:tbl>
               <a:tblPr>
                 <a:noFill/>
-                <a:tableStyleId>{EF6C54AC-8347-44DC-8B8D-82E599C378D7}</a:tableStyleId>
+                <a:tableStyleId>{DF492A7A-051D-4208-8BED-D5CB58FBCB7F}</a:tableStyleId>
               </a:tblPr>
               <a:tblGrid>
                 <a:gridCol w="452425"/>
@@ -12340,7 +12704,7 @@
       </p:graphicFrame>
       <p:graphicFrame>
         <p:nvGraphicFramePr>
-          <p:cNvPr id="136" name="Google Shape;136;p17"/>
+          <p:cNvPr id="150" name="Google Shape;150;p17"/>
           <p:cNvGraphicFramePr/>
           <p:nvPr/>
         </p:nvGraphicFramePr>
@@ -12353,7 +12717,7 @@
             <a:tbl>
               <a:tblPr>
                 <a:noFill/>
-                <a:tableStyleId>{EF6C54AC-8347-44DC-8B8D-82E599C378D7}</a:tableStyleId>
+                <a:tableStyleId>{DF492A7A-051D-4208-8BED-D5CB58FBCB7F}</a:tableStyleId>
               </a:tblPr>
               <a:tblGrid>
                 <a:gridCol w="452425"/>
@@ -12413,7 +12777,7 @@
       </p:graphicFrame>
       <p:sp>
         <p:nvSpPr>
-          <p:cNvPr id="137" name="Google Shape;137;p17"/>
+          <p:cNvPr id="151" name="Google Shape;151;p17"/>
           <p:cNvSpPr txBox="1"/>
           <p:nvPr>
             <p:ph idx="1" type="body"/>
@@ -12471,7 +12835,7 @@
       </p:sp>
       <p:sp>
         <p:nvSpPr>
-          <p:cNvPr id="138" name="Google Shape;138;p17"/>
+          <p:cNvPr id="152" name="Google Shape;152;p17"/>
           <p:cNvSpPr txBox="1"/>
           <p:nvPr>
             <p:ph idx="12" type="sldNum"/>
@@ -12522,7 +12886,7 @@
   <p:cSld>
     <p:spTree>
       <p:nvGrpSpPr>
-        <p:cNvPr id="142" name="Shape 142"/>
+        <p:cNvPr id="156" name="Shape 156"/>
         <p:cNvGrpSpPr/>
         <p:nvPr/>
       </p:nvGrpSpPr>
@@ -12536,7 +12900,7 @@
       </p:grpSpPr>
       <p:sp>
         <p:nvSpPr>
-          <p:cNvPr id="143" name="Google Shape;143;p18"/>
+          <p:cNvPr id="157" name="Google Shape;157;p18"/>
           <p:cNvSpPr txBox="1"/>
           <p:nvPr>
             <p:ph type="title"/>
@@ -12576,7 +12940,7 @@
       </p:sp>
       <p:sp>
         <p:nvSpPr>
-          <p:cNvPr id="144" name="Google Shape;144;p18"/>
+          <p:cNvPr id="158" name="Google Shape;158;p18"/>
           <p:cNvSpPr txBox="1"/>
           <p:nvPr>
             <p:ph idx="1" type="body"/>
@@ -12584,8 +12948,8 @@
         </p:nvSpPr>
         <p:spPr>
           <a:xfrm>
-            <a:off x="729450" y="1906663"/>
-            <a:ext cx="7688700" cy="1096800"/>
+            <a:off x="729450" y="1906675"/>
+            <a:ext cx="7688700" cy="2233800"/>
           </a:xfrm>
           <a:prstGeom prst="rect">
             <a:avLst/>
@@ -12593,11 +12957,11 @@
         </p:spPr>
         <p:txBody>
           <a:bodyPr anchorCtr="0" anchor="t" bIns="91425" lIns="91425" spcFirstLastPara="1" rIns="91425" wrap="square" tIns="91425">
-            <a:normAutofit/>
+            <a:normAutofit lnSpcReduction="20000"/>
           </a:bodyPr>
           <a:lstStyle/>
           <a:p>
-            <a:pPr indent="-311150" lvl="0" marL="457200" rtl="0" algn="l">
+            <a:pPr indent="-311150" lvl="0" marL="457200" rtl="0" algn="just">
               <a:spcBef>
                 <a:spcPts val="0"/>
               </a:spcBef>
@@ -12609,7 +12973,64 @@
             </a:pPr>
             <a:r>
               <a:rPr lang="pt-BR"/>
-              <a:t>Considerando a pior das hipóteses para da uma das alternativas apresentadas de busca, a busca binária se sai melhor que as demais, pois sua complexidade cresce mais lentamente, de maneira logarítmica, permitindo que uma tentativa extra possibilite buscar em uma variedade muito mais significativa de elementos</a:t>
+              <a:t>Considerando a pior das hipóteses para </a:t>
+            </a:r>
+            <a:r>
+              <a:rPr lang="pt-BR"/>
+              <a:t>cada uma</a:t>
+            </a:r>
+            <a:r>
+              <a:rPr lang="pt-BR"/>
+              <a:t> das alternativas apresentadas de busca, a busca binária se sai melhor que as demais, pois sua complexidade cresce mais lentamente, de maneira logarítmica, enquanto que as outras tinham complexidade linear (N). Tal complexidade logarítmica permite que uma tentativa extra possibilite buscar em uma variedade muito mais significativa de elementos.</a:t>
+            </a:r>
+            <a:endParaRPr/>
+          </a:p>
+          <a:p>
+            <a:pPr indent="-311150" lvl="0" marL="457200" rtl="0" algn="just">
+              <a:spcBef>
+                <a:spcPts val="0"/>
+              </a:spcBef>
+              <a:spcAft>
+                <a:spcPts val="0"/>
+              </a:spcAft>
+              <a:buSzPts val="1300"/>
+              <a:buChar char="●"/>
+            </a:pPr>
+            <a:r>
+              <a:rPr lang="pt-BR"/>
+              <a:t>Para utilizar a busca binária em um problema devemos perceber que ele apresenta </a:t>
+            </a:r>
+            <a:r>
+              <a:rPr lang="pt-BR"/>
+              <a:t>monotonicidade,</a:t>
+            </a:r>
+            <a:r>
+              <a:rPr lang="pt-BR"/>
+              <a:t> característica que nos permite </a:t>
+            </a:r>
+            <a:r>
+              <a:rPr lang="pt-BR"/>
+              <a:t>eliminar</a:t>
+            </a:r>
+            <a:r>
+              <a:rPr lang="pt-BR"/>
+              <a:t> parte do espaço de busca por perceber que a resposta não estará </a:t>
+            </a:r>
+            <a:r>
+              <a:rPr lang="pt-BR"/>
+              <a:t>lá.</a:t>
+            </a:r>
+            <a:r>
+              <a:rPr lang="pt-BR"/>
+              <a:t> No caso apresentado, a ordenação e a informação de que era maior ou menor tornava o problema monotonico. Caso não fosse monotônico </a:t>
+            </a:r>
+            <a:r>
+              <a:rPr lang="pt-BR"/>
+              <a:t>teríamos</a:t>
+            </a:r>
+            <a:r>
+              <a:rPr lang="pt-BR"/>
+              <a:t> que fazer uma busca linear mesmo.</a:t>
             </a:r>
             <a:endParaRPr/>
           </a:p>
@@ -12617,7 +13038,7 @@
       </p:sp>
       <p:sp>
         <p:nvSpPr>
-          <p:cNvPr id="145" name="Google Shape;145;p18"/>
+          <p:cNvPr id="159" name="Google Shape;159;p18"/>
           <p:cNvSpPr txBox="1"/>
           <p:nvPr>
             <p:ph idx="1" type="body"/>
@@ -12625,7 +13046,7 @@
         </p:nvSpPr>
         <p:spPr>
           <a:xfrm>
-            <a:off x="727650" y="3229388"/>
+            <a:off x="729450" y="3832713"/>
             <a:ext cx="7688700" cy="1096800"/>
           </a:xfrm>
           <a:prstGeom prst="rect">
@@ -12682,7 +13103,7 @@
       </p:sp>
       <p:sp>
         <p:nvSpPr>
-          <p:cNvPr id="146" name="Google Shape;146;p18"/>
+          <p:cNvPr id="160" name="Google Shape;160;p18"/>
           <p:cNvSpPr txBox="1"/>
           <p:nvPr>
             <p:ph idx="12" type="sldNum"/>
@@ -12733,7 +13154,7 @@
   <p:cSld>
     <p:spTree>
       <p:nvGrpSpPr>
-        <p:cNvPr id="150" name="Shape 150"/>
+        <p:cNvPr id="164" name="Shape 164"/>
         <p:cNvGrpSpPr/>
         <p:nvPr/>
       </p:nvGrpSpPr>
@@ -12747,7 +13168,7 @@
       </p:grpSpPr>
       <p:sp>
         <p:nvSpPr>
-          <p:cNvPr id="151" name="Google Shape;151;p19"/>
+          <p:cNvPr id="165" name="Google Shape;165;p19"/>
           <p:cNvSpPr txBox="1"/>
           <p:nvPr>
             <p:ph type="title"/>
@@ -12796,7 +13217,7 @@
       </p:sp>
       <p:sp>
         <p:nvSpPr>
-          <p:cNvPr id="152" name="Google Shape;152;p19"/>
+          <p:cNvPr id="166" name="Google Shape;166;p19"/>
           <p:cNvSpPr txBox="1"/>
           <p:nvPr>
             <p:ph idx="1" type="body"/>
@@ -12837,7 +13258,7 @@
       </p:sp>
       <p:pic>
         <p:nvPicPr>
-          <p:cNvPr id="153" name="Google Shape;153;p19"/>
+          <p:cNvPr id="167" name="Google Shape;167;p19"/>
           <p:cNvPicPr preferRelativeResize="0"/>
           <p:nvPr/>
         </p:nvPicPr>
@@ -12865,7 +13286,7 @@
       </p:pic>
       <p:sp>
         <p:nvSpPr>
-          <p:cNvPr id="154" name="Google Shape;154;p19"/>
+          <p:cNvPr id="168" name="Google Shape;168;p19"/>
           <p:cNvSpPr/>
           <p:nvPr/>
         </p:nvSpPr>
@@ -12917,7 +13338,7 @@
       </p:sp>
       <p:sp>
         <p:nvSpPr>
-          <p:cNvPr id="155" name="Google Shape;155;p19"/>
+          <p:cNvPr id="169" name="Google Shape;169;p19"/>
           <p:cNvSpPr txBox="1"/>
           <p:nvPr>
             <p:ph idx="1" type="body"/>
@@ -12957,7 +13378,7 @@
       </p:sp>
       <p:sp>
         <p:nvSpPr>
-          <p:cNvPr id="156" name="Google Shape;156;p19"/>
+          <p:cNvPr id="170" name="Google Shape;170;p19"/>
           <p:cNvSpPr/>
           <p:nvPr/>
         </p:nvSpPr>
@@ -13009,7 +13430,7 @@
       </p:sp>
       <p:sp>
         <p:nvSpPr>
-          <p:cNvPr id="157" name="Google Shape;157;p19"/>
+          <p:cNvPr id="171" name="Google Shape;171;p19"/>
           <p:cNvSpPr txBox="1"/>
           <p:nvPr>
             <p:ph idx="1" type="body"/>
@@ -13049,7 +13470,7 @@
       </p:sp>
       <p:sp>
         <p:nvSpPr>
-          <p:cNvPr id="158" name="Google Shape;158;p19"/>
+          <p:cNvPr id="172" name="Google Shape;172;p19"/>
           <p:cNvSpPr/>
           <p:nvPr/>
         </p:nvSpPr>
@@ -13101,7 +13522,7 @@
       </p:sp>
       <p:sp>
         <p:nvSpPr>
-          <p:cNvPr id="159" name="Google Shape;159;p19"/>
+          <p:cNvPr id="173" name="Google Shape;173;p19"/>
           <p:cNvSpPr txBox="1"/>
           <p:nvPr>
             <p:ph idx="1" type="body"/>
@@ -13141,7 +13562,7 @@
       </p:sp>
       <p:sp>
         <p:nvSpPr>
-          <p:cNvPr id="160" name="Google Shape;160;p19"/>
+          <p:cNvPr id="174" name="Google Shape;174;p19"/>
           <p:cNvSpPr/>
           <p:nvPr/>
         </p:nvSpPr>
@@ -13193,7 +13614,7 @@
       </p:sp>
       <p:sp>
         <p:nvSpPr>
-          <p:cNvPr id="161" name="Google Shape;161;p19"/>
+          <p:cNvPr id="175" name="Google Shape;175;p19"/>
           <p:cNvSpPr txBox="1"/>
           <p:nvPr>
             <p:ph idx="1" type="body"/>
@@ -13233,7 +13654,7 @@
       </p:sp>
       <p:sp>
         <p:nvSpPr>
-          <p:cNvPr id="162" name="Google Shape;162;p19"/>
+          <p:cNvPr id="176" name="Google Shape;176;p19"/>
           <p:cNvSpPr/>
           <p:nvPr/>
         </p:nvSpPr>
@@ -13285,7 +13706,7 @@
       </p:sp>
       <p:sp>
         <p:nvSpPr>
-          <p:cNvPr id="163" name="Google Shape;163;p19"/>
+          <p:cNvPr id="177" name="Google Shape;177;p19"/>
           <p:cNvSpPr txBox="1"/>
           <p:nvPr>
             <p:ph idx="1" type="body"/>
@@ -13325,7 +13746,7 @@
       </p:sp>
       <p:sp>
         <p:nvSpPr>
-          <p:cNvPr id="164" name="Google Shape;164;p19"/>
+          <p:cNvPr id="178" name="Google Shape;178;p19"/>
           <p:cNvSpPr txBox="1"/>
           <p:nvPr>
             <p:ph idx="12" type="sldNum"/>
@@ -13376,7 +13797,7 @@
   <p:cSld>
     <p:spTree>
       <p:nvGrpSpPr>
-        <p:cNvPr id="168" name="Shape 168"/>
+        <p:cNvPr id="182" name="Shape 182"/>
         <p:cNvGrpSpPr/>
         <p:nvPr/>
       </p:nvGrpSpPr>
@@ -13390,7 +13811,7 @@
       </p:grpSpPr>
       <p:sp>
         <p:nvSpPr>
-          <p:cNvPr id="169" name="Google Shape;169;p20"/>
+          <p:cNvPr id="183" name="Google Shape;183;p20"/>
           <p:cNvSpPr txBox="1"/>
           <p:nvPr>
             <p:ph type="title"/>
@@ -13439,7 +13860,7 @@
       </p:sp>
       <p:sp>
         <p:nvSpPr>
-          <p:cNvPr id="170" name="Google Shape;170;p20"/>
+          <p:cNvPr id="184" name="Google Shape;184;p20"/>
           <p:cNvSpPr txBox="1"/>
           <p:nvPr>
             <p:ph idx="1" type="body"/>
@@ -13456,7 +13877,7 @@
         </p:spPr>
         <p:txBody>
           <a:bodyPr anchorCtr="0" anchor="t" bIns="91425" lIns="91425" spcFirstLastPara="1" rIns="91425" wrap="square" tIns="91425">
-            <a:normAutofit/>
+            <a:normAutofit lnSpcReduction="20000"/>
           </a:bodyPr>
           <a:lstStyle/>
           <a:p>
@@ -13472,7 +13893,15 @@
             </a:pPr>
             <a:r>
               <a:rPr lang="pt-BR"/>
-              <a:t>O problema trabalha com valores bem limitantes: pontuações que vão até 10^9, até 10^5 faixas e 10^4 ogros, se para cada ogro forem verificadas todas as N faixas, na pior hipótese, dará TLE.</a:t>
+              <a:t>O problema trabalha com valores bem limitantes: pontuações que vão até 10^9, até 10^5 faixas e 10^4 ogros, se para cada ogro forem verificadas todas as N faixas, no pior caso possível, onde o ogro está na </a:t>
+            </a:r>
+            <a:r>
+              <a:rPr lang="pt-BR"/>
+              <a:t>última</a:t>
+            </a:r>
+            <a:r>
+              <a:rPr lang="pt-BR"/>
+              <a:t> faixa, dará TLE.</a:t>
             </a:r>
             <a:endParaRPr/>
           </a:p>
@@ -13480,7 +13909,7 @@
       </p:sp>
       <p:sp>
         <p:nvSpPr>
-          <p:cNvPr id="171" name="Google Shape;171;p20"/>
+          <p:cNvPr id="185" name="Google Shape;185;p20"/>
           <p:cNvSpPr txBox="1"/>
           <p:nvPr>
             <p:ph idx="1" type="body"/>
@@ -13537,7 +13966,7 @@
       </p:sp>
       <p:sp>
         <p:nvSpPr>
-          <p:cNvPr id="172" name="Google Shape;172;p20"/>
+          <p:cNvPr id="186" name="Google Shape;186;p20"/>
           <p:cNvSpPr txBox="1"/>
           <p:nvPr>
             <p:ph idx="12" type="sldNum"/>
@@ -13588,7 +14017,7 @@
   <p:cSld>
     <p:spTree>
       <p:nvGrpSpPr>
-        <p:cNvPr id="176" name="Shape 176"/>
+        <p:cNvPr id="190" name="Shape 190"/>
         <p:cNvGrpSpPr/>
         <p:nvPr/>
       </p:nvGrpSpPr>
@@ -13602,7 +14031,7 @@
       </p:grpSpPr>
       <p:sp>
         <p:nvSpPr>
-          <p:cNvPr id="177" name="Google Shape;177;p21"/>
+          <p:cNvPr id="191" name="Google Shape;191;p21"/>
           <p:cNvSpPr txBox="1"/>
           <p:nvPr>
             <p:ph type="title"/>
@@ -13651,7 +14080,7 @@
       </p:sp>
       <p:pic>
         <p:nvPicPr>
-          <p:cNvPr id="178" name="Google Shape;178;p21"/>
+          <p:cNvPr id="192" name="Google Shape;192;p21"/>
           <p:cNvPicPr preferRelativeResize="0"/>
           <p:nvPr/>
         </p:nvPicPr>
@@ -13679,7 +14108,7 @@
       </p:pic>
       <p:pic>
         <p:nvPicPr>
-          <p:cNvPr id="179" name="Google Shape;179;p21"/>
+          <p:cNvPr id="193" name="Google Shape;193;p21"/>
           <p:cNvPicPr preferRelativeResize="0"/>
           <p:nvPr/>
         </p:nvPicPr>
@@ -13707,7 +14136,7 @@
       </p:pic>
       <p:sp>
         <p:nvSpPr>
-          <p:cNvPr id="180" name="Google Shape;180;p21"/>
+          <p:cNvPr id="194" name="Google Shape;194;p21"/>
           <p:cNvSpPr/>
           <p:nvPr/>
         </p:nvSpPr>
@@ -13761,7 +14190,7 @@
       </p:sp>
       <p:sp>
         <p:nvSpPr>
-          <p:cNvPr id="181" name="Google Shape;181;p21"/>
+          <p:cNvPr id="195" name="Google Shape;195;p21"/>
           <p:cNvSpPr/>
           <p:nvPr/>
         </p:nvSpPr>
@@ -13815,7 +14244,7 @@
       </p:sp>
       <p:sp>
         <p:nvSpPr>
-          <p:cNvPr id="182" name="Google Shape;182;p21"/>
+          <p:cNvPr id="196" name="Google Shape;196;p21"/>
           <p:cNvSpPr txBox="1"/>
           <p:nvPr>
             <p:ph idx="12" type="sldNum"/>
@@ -13862,6 +14291,285 @@
 </file>
 
 <file path=ppt/theme/theme1.xml><?xml version="1.0" encoding="utf-8"?>
+<a:theme xmlns:a="http://schemas.openxmlformats.org/drawingml/2006/main" xmlns:r="http://schemas.openxmlformats.org/officeDocument/2006/relationships" name="Streamline">
+  <a:themeElements>
+    <a:clrScheme name="Streamline">
+      <a:dk1>
+        <a:srgbClr val="1A9988"/>
+      </a:dk1>
+      <a:lt1>
+        <a:srgbClr val="FFFFFF"/>
+      </a:lt1>
+      <a:dk2>
+        <a:srgbClr val="1A1A1A"/>
+      </a:dk2>
+      <a:lt2>
+        <a:srgbClr val="E9EDEE"/>
+      </a:lt2>
+      <a:accent1>
+        <a:srgbClr val="595959"/>
+      </a:accent1>
+      <a:accent2>
+        <a:srgbClr val="6AA4C8"/>
+      </a:accent2>
+      <a:accent3>
+        <a:srgbClr val="EB5600"/>
+      </a:accent3>
+      <a:accent4>
+        <a:srgbClr val="A2FFE8"/>
+      </a:accent4>
+      <a:accent5>
+        <a:srgbClr val="1C3678"/>
+      </a:accent5>
+      <a:accent6>
+        <a:srgbClr val="FFB8A2"/>
+      </a:accent6>
+      <a:hlink>
+        <a:srgbClr val="1C3678"/>
+      </a:hlink>
+      <a:folHlink>
+        <a:srgbClr val="1C3678"/>
+      </a:folHlink>
+    </a:clrScheme>
+    <a:fontScheme name="Office">
+      <a:majorFont>
+        <a:latin typeface="Arial"/>
+        <a:ea typeface=""/>
+        <a:cs typeface=""/>
+        <a:font script="Jpan" typeface="ＭＳ Ｐゴシック"/>
+        <a:font script="Hang" typeface="맑은 고딕"/>
+        <a:font script="Hans" typeface="宋体"/>
+        <a:font script="Hant" typeface="新細明體"/>
+        <a:font script="Arab" typeface="Times New Roman"/>
+        <a:font script="Hebr" typeface="Times New Roman"/>
+        <a:font script="Thai" typeface="Angsana New"/>
+        <a:font script="Ethi" typeface="Nyala"/>
+        <a:font script="Beng" typeface="Vrinda"/>
+        <a:font script="Gujr" typeface="Shruti"/>
+        <a:font script="Khmr" typeface="MoolBoran"/>
+        <a:font script="Knda" typeface="Tunga"/>
+        <a:font script="Guru" typeface="Raavi"/>
+        <a:font script="Cans" typeface="Euphemia"/>
+        <a:font script="Cher" typeface="Plantagenet Cherokee"/>
+        <a:font script="Yiii" typeface="Microsoft Yi Baiti"/>
+        <a:font script="Tibt" typeface="Microsoft Himalaya"/>
+        <a:font script="Thaa" typeface="MV Boli"/>
+        <a:font script="Deva" typeface="Mangal"/>
+        <a:font script="Telu" typeface="Gautami"/>
+        <a:font script="Taml" typeface="Latha"/>
+        <a:font script="Syrc" typeface="Estrangelo Edessa"/>
+        <a:font script="Orya" typeface="Kalinga"/>
+        <a:font script="Mlym" typeface="Kartika"/>
+        <a:font script="Laoo" typeface="DokChampa"/>
+        <a:font script="Sinh" typeface="Iskoola Pota"/>
+        <a:font script="Mong" typeface="Mongolian Baiti"/>
+        <a:font script="Viet" typeface="Times New Roman"/>
+        <a:font script="Uigh" typeface="Microsoft Uighur"/>
+        <a:font script="Geor" typeface="Sylfaen"/>
+      </a:majorFont>
+      <a:minorFont>
+        <a:latin typeface="Arial"/>
+        <a:ea typeface=""/>
+        <a:cs typeface=""/>
+        <a:font script="Jpan" typeface="ＭＳ Ｐゴシック"/>
+        <a:font script="Hang" typeface="맑은 고딕"/>
+        <a:font script="Hans" typeface="宋体"/>
+        <a:font script="Hant" typeface="新細明體"/>
+        <a:font script="Arab" typeface="Arial"/>
+        <a:font script="Hebr" typeface="Arial"/>
+        <a:font script="Thai" typeface="Cordia New"/>
+        <a:font script="Ethi" typeface="Nyala"/>
+        <a:font script="Beng" typeface="Vrinda"/>
+        <a:font script="Gujr" typeface="Shruti"/>
+        <a:font script="Khmr" typeface="DaunPenh"/>
+        <a:font script="Knda" typeface="Tunga"/>
+        <a:font script="Guru" typeface="Raavi"/>
+        <a:font script="Cans" typeface="Euphemia"/>
+        <a:font script="Cher" typeface="Plantagenet Cherokee"/>
+        <a:font script="Yiii" typeface="Microsoft Yi Baiti"/>
+        <a:font script="Tibt" typeface="Microsoft Himalaya"/>
+        <a:font script="Thaa" typeface="MV Boli"/>
+        <a:font script="Deva" typeface="Mangal"/>
+        <a:font script="Telu" typeface="Gautami"/>
+        <a:font script="Taml" typeface="Latha"/>
+        <a:font script="Syrc" typeface="Estrangelo Edessa"/>
+        <a:font script="Orya" typeface="Kalinga"/>
+        <a:font script="Mlym" typeface="Kartika"/>
+        <a:font script="Laoo" typeface="DokChampa"/>
+        <a:font script="Sinh" typeface="Iskoola Pota"/>
+        <a:font script="Mong" typeface="Mongolian Baiti"/>
+        <a:font script="Viet" typeface="Arial"/>
+        <a:font script="Uigh" typeface="Microsoft Uighur"/>
+        <a:font script="Geor" typeface="Sylfaen"/>
+      </a:minorFont>
+    </a:fontScheme>
+    <a:fmtScheme name="Office">
+      <a:fillStyleLst>
+        <a:solidFill>
+          <a:schemeClr val="phClr"/>
+        </a:solidFill>
+        <a:gradFill rotWithShape="1">
+          <a:gsLst>
+            <a:gs pos="0">
+              <a:schemeClr val="phClr">
+                <a:tint val="50000"/>
+                <a:satMod val="300000"/>
+              </a:schemeClr>
+            </a:gs>
+            <a:gs pos="35000">
+              <a:schemeClr val="phClr">
+                <a:tint val="37000"/>
+                <a:satMod val="300000"/>
+              </a:schemeClr>
+            </a:gs>
+            <a:gs pos="100000">
+              <a:schemeClr val="phClr">
+                <a:tint val="15000"/>
+                <a:satMod val="350000"/>
+              </a:schemeClr>
+            </a:gs>
+          </a:gsLst>
+          <a:lin ang="16200000" scaled="1"/>
+        </a:gradFill>
+        <a:gradFill rotWithShape="1">
+          <a:gsLst>
+            <a:gs pos="0">
+              <a:schemeClr val="phClr">
+                <a:tint val="100000"/>
+                <a:shade val="100000"/>
+                <a:satMod val="130000"/>
+              </a:schemeClr>
+            </a:gs>
+            <a:gs pos="100000">
+              <a:schemeClr val="phClr">
+                <a:tint val="50000"/>
+                <a:shade val="100000"/>
+                <a:satMod val="350000"/>
+              </a:schemeClr>
+            </a:gs>
+          </a:gsLst>
+          <a:lin ang="16200000" scaled="0"/>
+        </a:gradFill>
+      </a:fillStyleLst>
+      <a:lnStyleLst>
+        <a:ln w="9525" cap="flat" cmpd="sng" algn="ctr">
+          <a:solidFill>
+            <a:schemeClr val="phClr">
+              <a:shade val="95000"/>
+              <a:satMod val="105000"/>
+            </a:schemeClr>
+          </a:solidFill>
+          <a:prstDash val="solid"/>
+        </a:ln>
+        <a:ln w="25400" cap="flat" cmpd="sng" algn="ctr">
+          <a:solidFill>
+            <a:schemeClr val="phClr"/>
+          </a:solidFill>
+          <a:prstDash val="solid"/>
+        </a:ln>
+        <a:ln w="38100" cap="flat" cmpd="sng" algn="ctr">
+          <a:solidFill>
+            <a:schemeClr val="phClr"/>
+          </a:solidFill>
+          <a:prstDash val="solid"/>
+        </a:ln>
+      </a:lnStyleLst>
+      <a:effectStyleLst>
+        <a:effectStyle>
+          <a:effectLst>
+            <a:outerShdw blurRad="40000" dist="20000" dir="5400000" rotWithShape="0">
+              <a:srgbClr val="000000">
+                <a:alpha val="38000"/>
+              </a:srgbClr>
+            </a:outerShdw>
+          </a:effectLst>
+        </a:effectStyle>
+        <a:effectStyle>
+          <a:effectLst>
+            <a:outerShdw blurRad="40000" dist="23000" dir="5400000" rotWithShape="0">
+              <a:srgbClr val="000000">
+                <a:alpha val="35000"/>
+              </a:srgbClr>
+            </a:outerShdw>
+          </a:effectLst>
+        </a:effectStyle>
+        <a:effectStyle>
+          <a:effectLst>
+            <a:outerShdw blurRad="40000" dist="23000" dir="5400000" rotWithShape="0">
+              <a:srgbClr val="000000">
+                <a:alpha val="35000"/>
+              </a:srgbClr>
+            </a:outerShdw>
+          </a:effectLst>
+          <a:scene3d>
+            <a:camera prst="orthographicFront">
+              <a:rot lat="0" lon="0" rev="0"/>
+            </a:camera>
+            <a:lightRig rig="threePt" dir="t">
+              <a:rot lat="0" lon="0" rev="1200000"/>
+            </a:lightRig>
+          </a:scene3d>
+          <a:sp3d>
+            <a:bevelT w="63500" h="25400"/>
+          </a:sp3d>
+        </a:effectStyle>
+      </a:effectStyleLst>
+      <a:bgFillStyleLst>
+        <a:solidFill>
+          <a:schemeClr val="phClr"/>
+        </a:solidFill>
+        <a:gradFill rotWithShape="1">
+          <a:gsLst>
+            <a:gs pos="0">
+              <a:schemeClr val="phClr">
+                <a:tint val="40000"/>
+                <a:satMod val="350000"/>
+              </a:schemeClr>
+            </a:gs>
+            <a:gs pos="40000">
+              <a:schemeClr val="phClr">
+                <a:tint val="45000"/>
+                <a:shade val="99000"/>
+                <a:satMod val="350000"/>
+              </a:schemeClr>
+            </a:gs>
+            <a:gs pos="100000">
+              <a:schemeClr val="phClr">
+                <a:shade val="20000"/>
+                <a:satMod val="255000"/>
+              </a:schemeClr>
+            </a:gs>
+          </a:gsLst>
+          <a:path path="circle">
+            <a:fillToRect l="50000" t="-80000" r="50000" b="180000"/>
+          </a:path>
+        </a:gradFill>
+        <a:gradFill rotWithShape="1">
+          <a:gsLst>
+            <a:gs pos="0">
+              <a:schemeClr val="phClr">
+                <a:tint val="80000"/>
+                <a:satMod val="300000"/>
+              </a:schemeClr>
+            </a:gs>
+            <a:gs pos="100000">
+              <a:schemeClr val="phClr">
+                <a:shade val="30000"/>
+                <a:satMod val="200000"/>
+              </a:schemeClr>
+            </a:gs>
+          </a:gsLst>
+          <a:path path="circle">
+            <a:fillToRect l="50000" t="50000" r="50000" b="50000"/>
+          </a:path>
+        </a:gradFill>
+      </a:bgFillStyleLst>
+    </a:fmtScheme>
+  </a:themeElements>
+</a:theme>
+</file>
+
+<file path=ppt/theme/theme2.xml><?xml version="1.0" encoding="utf-8"?>
 <a:theme xmlns:a="http://schemas.openxmlformats.org/drawingml/2006/main" xmlns:r="http://schemas.openxmlformats.org/officeDocument/2006/relationships">
   <a:themeElements>
     <a:clrScheme name="Default">
@@ -14138,283 +14846,4 @@
     </a:fmtScheme>
   </a:themeElements>
 </a:theme>
-</file>
-
-<file path=ppt/theme/theme2.xml><?xml version="1.0" encoding="utf-8"?>
-<a:theme xmlns:a="http://schemas.openxmlformats.org/drawingml/2006/main" xmlns:r="http://schemas.openxmlformats.org/officeDocument/2006/relationships" name="Streamline">
-  <a:themeElements>
-    <a:clrScheme name="Streamline">
-      <a:dk1>
-        <a:srgbClr val="1A9988"/>
-      </a:dk1>
-      <a:lt1>
-        <a:srgbClr val="FFFFFF"/>
-      </a:lt1>
-      <a:dk2>
-        <a:srgbClr val="1A1A1A"/>
-      </a:dk2>
-      <a:lt2>
-        <a:srgbClr val="E9EDEE"/>
-      </a:lt2>
-      <a:accent1>
-        <a:srgbClr val="595959"/>
-      </a:accent1>
-      <a:accent2>
-        <a:srgbClr val="6AA4C8"/>
-      </a:accent2>
-      <a:accent3>
-        <a:srgbClr val="EB5600"/>
-      </a:accent3>
-      <a:accent4>
-        <a:srgbClr val="A2FFE8"/>
-      </a:accent4>
-      <a:accent5>
-        <a:srgbClr val="1C3678"/>
-      </a:accent5>
-      <a:accent6>
-        <a:srgbClr val="FFB8A2"/>
-      </a:accent6>
-      <a:hlink>
-        <a:srgbClr val="1C3678"/>
-      </a:hlink>
-      <a:folHlink>
-        <a:srgbClr val="1C3678"/>
-      </a:folHlink>
-    </a:clrScheme>
-    <a:fontScheme name="Office">
-      <a:majorFont>
-        <a:latin typeface="Arial"/>
-        <a:ea typeface=""/>
-        <a:cs typeface=""/>
-        <a:font script="Jpan" typeface="ＭＳ Ｐゴシック"/>
-        <a:font script="Hang" typeface="맑은 고딕"/>
-        <a:font script="Hans" typeface="宋体"/>
-        <a:font script="Hant" typeface="新細明體"/>
-        <a:font script="Arab" typeface="Times New Roman"/>
-        <a:font script="Hebr" typeface="Times New Roman"/>
-        <a:font script="Thai" typeface="Angsana New"/>
-        <a:font script="Ethi" typeface="Nyala"/>
-        <a:font script="Beng" typeface="Vrinda"/>
-        <a:font script="Gujr" typeface="Shruti"/>
-        <a:font script="Khmr" typeface="MoolBoran"/>
-        <a:font script="Knda" typeface="Tunga"/>
-        <a:font script="Guru" typeface="Raavi"/>
-        <a:font script="Cans" typeface="Euphemia"/>
-        <a:font script="Cher" typeface="Plantagenet Cherokee"/>
-        <a:font script="Yiii" typeface="Microsoft Yi Baiti"/>
-        <a:font script="Tibt" typeface="Microsoft Himalaya"/>
-        <a:font script="Thaa" typeface="MV Boli"/>
-        <a:font script="Deva" typeface="Mangal"/>
-        <a:font script="Telu" typeface="Gautami"/>
-        <a:font script="Taml" typeface="Latha"/>
-        <a:font script="Syrc" typeface="Estrangelo Edessa"/>
-        <a:font script="Orya" typeface="Kalinga"/>
-        <a:font script="Mlym" typeface="Kartika"/>
-        <a:font script="Laoo" typeface="DokChampa"/>
-        <a:font script="Sinh" typeface="Iskoola Pota"/>
-        <a:font script="Mong" typeface="Mongolian Baiti"/>
-        <a:font script="Viet" typeface="Times New Roman"/>
-        <a:font script="Uigh" typeface="Microsoft Uighur"/>
-        <a:font script="Geor" typeface="Sylfaen"/>
-      </a:majorFont>
-      <a:minorFont>
-        <a:latin typeface="Arial"/>
-        <a:ea typeface=""/>
-        <a:cs typeface=""/>
-        <a:font script="Jpan" typeface="ＭＳ Ｐゴシック"/>
-        <a:font script="Hang" typeface="맑은 고딕"/>
-        <a:font script="Hans" typeface="宋体"/>
-        <a:font script="Hant" typeface="新細明體"/>
-        <a:font script="Arab" typeface="Arial"/>
-        <a:font script="Hebr" typeface="Arial"/>
-        <a:font script="Thai" typeface="Cordia New"/>
-        <a:font script="Ethi" typeface="Nyala"/>
-        <a:font script="Beng" typeface="Vrinda"/>
-        <a:font script="Gujr" typeface="Shruti"/>
-        <a:font script="Khmr" typeface="DaunPenh"/>
-        <a:font script="Knda" typeface="Tunga"/>
-        <a:font script="Guru" typeface="Raavi"/>
-        <a:font script="Cans" typeface="Euphemia"/>
-        <a:font script="Cher" typeface="Plantagenet Cherokee"/>
-        <a:font script="Yiii" typeface="Microsoft Yi Baiti"/>
-        <a:font script="Tibt" typeface="Microsoft Himalaya"/>
-        <a:font script="Thaa" typeface="MV Boli"/>
-        <a:font script="Deva" typeface="Mangal"/>
-        <a:font script="Telu" typeface="Gautami"/>
-        <a:font script="Taml" typeface="Latha"/>
-        <a:font script="Syrc" typeface="Estrangelo Edessa"/>
-        <a:font script="Orya" typeface="Kalinga"/>
-        <a:font script="Mlym" typeface="Kartika"/>
-        <a:font script="Laoo" typeface="DokChampa"/>
-        <a:font script="Sinh" typeface="Iskoola Pota"/>
-        <a:font script="Mong" typeface="Mongolian Baiti"/>
-        <a:font script="Viet" typeface="Arial"/>
-        <a:font script="Uigh" typeface="Microsoft Uighur"/>
-        <a:font script="Geor" typeface="Sylfaen"/>
-      </a:minorFont>
-    </a:fontScheme>
-    <a:fmtScheme name="Office">
-      <a:fillStyleLst>
-        <a:solidFill>
-          <a:schemeClr val="phClr"/>
-        </a:solidFill>
-        <a:gradFill rotWithShape="1">
-          <a:gsLst>
-            <a:gs pos="0">
-              <a:schemeClr val="phClr">
-                <a:tint val="50000"/>
-                <a:satMod val="300000"/>
-              </a:schemeClr>
-            </a:gs>
-            <a:gs pos="35000">
-              <a:schemeClr val="phClr">
-                <a:tint val="37000"/>
-                <a:satMod val="300000"/>
-              </a:schemeClr>
-            </a:gs>
-            <a:gs pos="100000">
-              <a:schemeClr val="phClr">
-                <a:tint val="15000"/>
-                <a:satMod val="350000"/>
-              </a:schemeClr>
-            </a:gs>
-          </a:gsLst>
-          <a:lin ang="16200000" scaled="1"/>
-        </a:gradFill>
-        <a:gradFill rotWithShape="1">
-          <a:gsLst>
-            <a:gs pos="0">
-              <a:schemeClr val="phClr">
-                <a:tint val="100000"/>
-                <a:shade val="100000"/>
-                <a:satMod val="130000"/>
-              </a:schemeClr>
-            </a:gs>
-            <a:gs pos="100000">
-              <a:schemeClr val="phClr">
-                <a:tint val="50000"/>
-                <a:shade val="100000"/>
-                <a:satMod val="350000"/>
-              </a:schemeClr>
-            </a:gs>
-          </a:gsLst>
-          <a:lin ang="16200000" scaled="0"/>
-        </a:gradFill>
-      </a:fillStyleLst>
-      <a:lnStyleLst>
-        <a:ln w="9525" cap="flat" cmpd="sng" algn="ctr">
-          <a:solidFill>
-            <a:schemeClr val="phClr">
-              <a:shade val="95000"/>
-              <a:satMod val="105000"/>
-            </a:schemeClr>
-          </a:solidFill>
-          <a:prstDash val="solid"/>
-        </a:ln>
-        <a:ln w="25400" cap="flat" cmpd="sng" algn="ctr">
-          <a:solidFill>
-            <a:schemeClr val="phClr"/>
-          </a:solidFill>
-          <a:prstDash val="solid"/>
-        </a:ln>
-        <a:ln w="38100" cap="flat" cmpd="sng" algn="ctr">
-          <a:solidFill>
-            <a:schemeClr val="phClr"/>
-          </a:solidFill>
-          <a:prstDash val="solid"/>
-        </a:ln>
-      </a:lnStyleLst>
-      <a:effectStyleLst>
-        <a:effectStyle>
-          <a:effectLst>
-            <a:outerShdw blurRad="40000" dist="20000" dir="5400000" rotWithShape="0">
-              <a:srgbClr val="000000">
-                <a:alpha val="38000"/>
-              </a:srgbClr>
-            </a:outerShdw>
-          </a:effectLst>
-        </a:effectStyle>
-        <a:effectStyle>
-          <a:effectLst>
-            <a:outerShdw blurRad="40000" dist="23000" dir="5400000" rotWithShape="0">
-              <a:srgbClr val="000000">
-                <a:alpha val="35000"/>
-              </a:srgbClr>
-            </a:outerShdw>
-          </a:effectLst>
-        </a:effectStyle>
-        <a:effectStyle>
-          <a:effectLst>
-            <a:outerShdw blurRad="40000" dist="23000" dir="5400000" rotWithShape="0">
-              <a:srgbClr val="000000">
-                <a:alpha val="35000"/>
-              </a:srgbClr>
-            </a:outerShdw>
-          </a:effectLst>
-          <a:scene3d>
-            <a:camera prst="orthographicFront">
-              <a:rot lat="0" lon="0" rev="0"/>
-            </a:camera>
-            <a:lightRig rig="threePt" dir="t">
-              <a:rot lat="0" lon="0" rev="1200000"/>
-            </a:lightRig>
-          </a:scene3d>
-          <a:sp3d>
-            <a:bevelT w="63500" h="25400"/>
-          </a:sp3d>
-        </a:effectStyle>
-      </a:effectStyleLst>
-      <a:bgFillStyleLst>
-        <a:solidFill>
-          <a:schemeClr val="phClr"/>
-        </a:solidFill>
-        <a:gradFill rotWithShape="1">
-          <a:gsLst>
-            <a:gs pos="0">
-              <a:schemeClr val="phClr">
-                <a:tint val="40000"/>
-                <a:satMod val="350000"/>
-              </a:schemeClr>
-            </a:gs>
-            <a:gs pos="40000">
-              <a:schemeClr val="phClr">
-                <a:tint val="45000"/>
-                <a:shade val="99000"/>
-                <a:satMod val="350000"/>
-              </a:schemeClr>
-            </a:gs>
-            <a:gs pos="100000">
-              <a:schemeClr val="phClr">
-                <a:shade val="20000"/>
-                <a:satMod val="255000"/>
-              </a:schemeClr>
-            </a:gs>
-          </a:gsLst>
-          <a:path path="circle">
-            <a:fillToRect l="50000" t="-80000" r="50000" b="180000"/>
-          </a:path>
-        </a:gradFill>
-        <a:gradFill rotWithShape="1">
-          <a:gsLst>
-            <a:gs pos="0">
-              <a:schemeClr val="phClr">
-                <a:tint val="80000"/>
-                <a:satMod val="300000"/>
-              </a:schemeClr>
-            </a:gs>
-            <a:gs pos="100000">
-              <a:schemeClr val="phClr">
-                <a:shade val="30000"/>
-                <a:satMod val="200000"/>
-              </a:schemeClr>
-            </a:gs>
-          </a:gsLst>
-          <a:path path="circle">
-            <a:fillToRect l="50000" t="50000" r="50000" b="50000"/>
-          </a:path>
-        </a:gradFill>
-      </a:bgFillStyleLst>
-    </a:fmtScheme>
-  </a:themeElements>
-</a:theme>
 </file>
</xml_diff>